<commit_message>
Power point de socioemocioal quase pronto
</commit_message>
<xml_diff>
--- a/Larry Page.pptx
+++ b/Larry Page.pptx
@@ -4,9 +4,14 @@
   <p:sldMasterIdLst>
     <p:sldMasterId id="2147483665" r:id="rId1"/>
   </p:sldMasterIdLst>
+  <p:notesMasterIdLst>
+    <p:notesMasterId r:id="rId6"/>
+  </p:notesMasterIdLst>
   <p:sldIdLst>
     <p:sldId id="256" r:id="rId2"/>
     <p:sldId id="257" r:id="rId3"/>
+    <p:sldId id="258" r:id="rId4"/>
+    <p:sldId id="259" r:id="rId5"/>
   </p:sldIdLst>
   <p:sldSz cx="12192000" cy="6858000"/>
   <p:notesSz cx="6858000" cy="9144000"/>
@@ -105,7 +110,361 @@
       </a:defRPr>
     </a:lvl9pPr>
   </p:defaultTextStyle>
+  <p:extLst>
+    <p:ext uri="{EFAFB233-063F-42B5-8137-9DF3F51BA10A}">
+      <p15:sldGuideLst xmlns:p15="http://schemas.microsoft.com/office/powerpoint/2012/main"/>
+    </p:ext>
+  </p:extLst>
 </p:presentation>
+</file>
+
+<file path=ppt/notesMasters/notesMaster1.xml><?xml version="1.0" encoding="utf-8"?>
+<p:notesMaster xmlns:a="http://schemas.openxmlformats.org/drawingml/2006/main" xmlns:r="http://schemas.openxmlformats.org/officeDocument/2006/relationships" xmlns:p="http://schemas.openxmlformats.org/presentationml/2006/main">
+  <p:cSld>
+    <p:bg>
+      <p:bgRef idx="1001">
+        <a:schemeClr val="bg1"/>
+      </p:bgRef>
+    </p:bg>
+    <p:spTree>
+      <p:nvGrpSpPr>
+        <p:cNvPr id="1" name=""/>
+        <p:cNvGrpSpPr/>
+        <p:nvPr/>
+      </p:nvGrpSpPr>
+      <p:grpSpPr>
+        <a:xfrm>
+          <a:off x="0" y="0"/>
+          <a:ext cx="0" cy="0"/>
+          <a:chOff x="0" y="0"/>
+          <a:chExt cx="0" cy="0"/>
+        </a:xfrm>
+      </p:grpSpPr>
+      <p:sp>
+        <p:nvSpPr>
+          <p:cNvPr id="2" name="Espaço Reservado para Cabeçalho 1"/>
+          <p:cNvSpPr>
+            <a:spLocks noGrp="1"/>
+          </p:cNvSpPr>
+          <p:nvPr>
+            <p:ph type="hdr" sz="quarter"/>
+          </p:nvPr>
+        </p:nvSpPr>
+        <p:spPr>
+          <a:xfrm>
+            <a:off x="0" y="0"/>
+            <a:ext cx="2971800" cy="458788"/>
+          </a:xfrm>
+          <a:prstGeom prst="rect">
+            <a:avLst/>
+          </a:prstGeom>
+        </p:spPr>
+        <p:txBody>
+          <a:bodyPr vert="horz" lIns="91440" tIns="45720" rIns="91440" bIns="45720" rtlCol="0"/>
+          <a:lstStyle>
+            <a:lvl1pPr algn="l">
+              <a:defRPr sz="1200"/>
+            </a:lvl1pPr>
+          </a:lstStyle>
+          <a:p>
+            <a:endParaRPr lang="pt-BR"/>
+          </a:p>
+        </p:txBody>
+      </p:sp>
+      <p:sp>
+        <p:nvSpPr>
+          <p:cNvPr id="3" name="Espaço Reservado para Data 2"/>
+          <p:cNvSpPr>
+            <a:spLocks noGrp="1"/>
+          </p:cNvSpPr>
+          <p:nvPr>
+            <p:ph type="dt" idx="1"/>
+          </p:nvPr>
+        </p:nvSpPr>
+        <p:spPr>
+          <a:xfrm>
+            <a:off x="3884613" y="0"/>
+            <a:ext cx="2971800" cy="458788"/>
+          </a:xfrm>
+          <a:prstGeom prst="rect">
+            <a:avLst/>
+          </a:prstGeom>
+        </p:spPr>
+        <p:txBody>
+          <a:bodyPr vert="horz" lIns="91440" tIns="45720" rIns="91440" bIns="45720" rtlCol="0"/>
+          <a:lstStyle>
+            <a:lvl1pPr algn="r">
+              <a:defRPr sz="1200"/>
+            </a:lvl1pPr>
+          </a:lstStyle>
+          <a:p>
+            <a:fld id="{73E27D04-823F-4E3E-BAB4-BA4F2AC95041}" type="datetimeFigureOut">
+              <a:rPr lang="pt-BR" smtClean="0"/>
+              <a:t>18/11/2019</a:t>
+            </a:fld>
+            <a:endParaRPr lang="pt-BR"/>
+          </a:p>
+        </p:txBody>
+      </p:sp>
+      <p:sp>
+        <p:nvSpPr>
+          <p:cNvPr id="4" name="Espaço Reservado para Imagem de Slide 3"/>
+          <p:cNvSpPr>
+            <a:spLocks noGrp="1" noRot="1" noChangeAspect="1"/>
+          </p:cNvSpPr>
+          <p:nvPr>
+            <p:ph type="sldImg" idx="2"/>
+          </p:nvPr>
+        </p:nvSpPr>
+        <p:spPr>
+          <a:xfrm>
+            <a:off x="685800" y="1143000"/>
+            <a:ext cx="5486400" cy="3086100"/>
+          </a:xfrm>
+          <a:prstGeom prst="rect">
+            <a:avLst/>
+          </a:prstGeom>
+          <a:noFill/>
+          <a:ln w="12700">
+            <a:solidFill>
+              <a:prstClr val="black"/>
+            </a:solidFill>
+          </a:ln>
+        </p:spPr>
+        <p:txBody>
+          <a:bodyPr vert="horz" lIns="91440" tIns="45720" rIns="91440" bIns="45720" rtlCol="0" anchor="ctr"/>
+          <a:lstStyle/>
+          <a:p>
+            <a:endParaRPr lang="pt-BR"/>
+          </a:p>
+        </p:txBody>
+      </p:sp>
+      <p:sp>
+        <p:nvSpPr>
+          <p:cNvPr id="5" name="Espaço Reservado para Anotações 4"/>
+          <p:cNvSpPr>
+            <a:spLocks noGrp="1"/>
+          </p:cNvSpPr>
+          <p:nvPr>
+            <p:ph type="body" sz="quarter" idx="3"/>
+          </p:nvPr>
+        </p:nvSpPr>
+        <p:spPr>
+          <a:xfrm>
+            <a:off x="685800" y="4400550"/>
+            <a:ext cx="5486400" cy="3600450"/>
+          </a:xfrm>
+          <a:prstGeom prst="rect">
+            <a:avLst/>
+          </a:prstGeom>
+        </p:spPr>
+        <p:txBody>
+          <a:bodyPr vert="horz" lIns="91440" tIns="45720" rIns="91440" bIns="45720" rtlCol="0"/>
+          <a:lstStyle/>
+          <a:p>
+            <a:pPr lvl="0"/>
+            <a:r>
+              <a:rPr lang="pt-BR"/>
+              <a:t>Clique para editar os estilos de texto Mestres</a:t>
+            </a:r>
+          </a:p>
+          <a:p>
+            <a:pPr lvl="1"/>
+            <a:r>
+              <a:rPr lang="pt-BR"/>
+              <a:t>Segundo nível</a:t>
+            </a:r>
+          </a:p>
+          <a:p>
+            <a:pPr lvl="2"/>
+            <a:r>
+              <a:rPr lang="pt-BR"/>
+              <a:t>Terceiro nível</a:t>
+            </a:r>
+          </a:p>
+          <a:p>
+            <a:pPr lvl="3"/>
+            <a:r>
+              <a:rPr lang="pt-BR"/>
+              <a:t>Quarto nível</a:t>
+            </a:r>
+          </a:p>
+          <a:p>
+            <a:pPr lvl="4"/>
+            <a:r>
+              <a:rPr lang="pt-BR"/>
+              <a:t>Quinto nível</a:t>
+            </a:r>
+          </a:p>
+        </p:txBody>
+      </p:sp>
+      <p:sp>
+        <p:nvSpPr>
+          <p:cNvPr id="6" name="Espaço Reservado para Rodapé 5"/>
+          <p:cNvSpPr>
+            <a:spLocks noGrp="1"/>
+          </p:cNvSpPr>
+          <p:nvPr>
+            <p:ph type="ftr" sz="quarter" idx="4"/>
+          </p:nvPr>
+        </p:nvSpPr>
+        <p:spPr>
+          <a:xfrm>
+            <a:off x="0" y="8685213"/>
+            <a:ext cx="2971800" cy="458787"/>
+          </a:xfrm>
+          <a:prstGeom prst="rect">
+            <a:avLst/>
+          </a:prstGeom>
+        </p:spPr>
+        <p:txBody>
+          <a:bodyPr vert="horz" lIns="91440" tIns="45720" rIns="91440" bIns="45720" rtlCol="0" anchor="b"/>
+          <a:lstStyle>
+            <a:lvl1pPr algn="l">
+              <a:defRPr sz="1200"/>
+            </a:lvl1pPr>
+          </a:lstStyle>
+          <a:p>
+            <a:endParaRPr lang="pt-BR"/>
+          </a:p>
+        </p:txBody>
+      </p:sp>
+      <p:sp>
+        <p:nvSpPr>
+          <p:cNvPr id="7" name="Espaço Reservado para Número de Slide 6"/>
+          <p:cNvSpPr>
+            <a:spLocks noGrp="1"/>
+          </p:cNvSpPr>
+          <p:nvPr>
+            <p:ph type="sldNum" sz="quarter" idx="5"/>
+          </p:nvPr>
+        </p:nvSpPr>
+        <p:spPr>
+          <a:xfrm>
+            <a:off x="3884613" y="8685213"/>
+            <a:ext cx="2971800" cy="458787"/>
+          </a:xfrm>
+          <a:prstGeom prst="rect">
+            <a:avLst/>
+          </a:prstGeom>
+        </p:spPr>
+        <p:txBody>
+          <a:bodyPr vert="horz" lIns="91440" tIns="45720" rIns="91440" bIns="45720" rtlCol="0" anchor="b"/>
+          <a:lstStyle>
+            <a:lvl1pPr algn="r">
+              <a:defRPr sz="1200"/>
+            </a:lvl1pPr>
+          </a:lstStyle>
+          <a:p>
+            <a:fld id="{B1A882A0-68F9-4532-99E6-D25FD0A25E91}" type="slidenum">
+              <a:rPr lang="pt-BR" smtClean="0"/>
+              <a:t>‹nº›</a:t>
+            </a:fld>
+            <a:endParaRPr lang="pt-BR"/>
+          </a:p>
+        </p:txBody>
+      </p:sp>
+    </p:spTree>
+    <p:extLst>
+      <p:ext uri="{BB962C8B-B14F-4D97-AF65-F5344CB8AC3E}">
+        <p14:creationId xmlns:p14="http://schemas.microsoft.com/office/powerpoint/2010/main" val="2901747536"/>
+      </p:ext>
+    </p:extLst>
+  </p:cSld>
+  <p:clrMap bg1="lt1" tx1="dk1" bg2="lt2" tx2="dk2" accent1="accent1" accent2="accent2" accent3="accent3" accent4="accent4" accent5="accent5" accent6="accent6" hlink="hlink" folHlink="folHlink"/>
+  <p:notesStyle>
+    <a:lvl1pPr marL="0" algn="l" defTabSz="914400" rtl="0" eaLnBrk="1" latinLnBrk="0" hangingPunct="1">
+      <a:defRPr sz="1200" kern="1200">
+        <a:solidFill>
+          <a:schemeClr val="tx1"/>
+        </a:solidFill>
+        <a:latin typeface="+mn-lt"/>
+        <a:ea typeface="+mn-ea"/>
+        <a:cs typeface="+mn-cs"/>
+      </a:defRPr>
+    </a:lvl1pPr>
+    <a:lvl2pPr marL="457200" algn="l" defTabSz="914400" rtl="0" eaLnBrk="1" latinLnBrk="0" hangingPunct="1">
+      <a:defRPr sz="1200" kern="1200">
+        <a:solidFill>
+          <a:schemeClr val="tx1"/>
+        </a:solidFill>
+        <a:latin typeface="+mn-lt"/>
+        <a:ea typeface="+mn-ea"/>
+        <a:cs typeface="+mn-cs"/>
+      </a:defRPr>
+    </a:lvl2pPr>
+    <a:lvl3pPr marL="914400" algn="l" defTabSz="914400" rtl="0" eaLnBrk="1" latinLnBrk="0" hangingPunct="1">
+      <a:defRPr sz="1200" kern="1200">
+        <a:solidFill>
+          <a:schemeClr val="tx1"/>
+        </a:solidFill>
+        <a:latin typeface="+mn-lt"/>
+        <a:ea typeface="+mn-ea"/>
+        <a:cs typeface="+mn-cs"/>
+      </a:defRPr>
+    </a:lvl3pPr>
+    <a:lvl4pPr marL="1371600" algn="l" defTabSz="914400" rtl="0" eaLnBrk="1" latinLnBrk="0" hangingPunct="1">
+      <a:defRPr sz="1200" kern="1200">
+        <a:solidFill>
+          <a:schemeClr val="tx1"/>
+        </a:solidFill>
+        <a:latin typeface="+mn-lt"/>
+        <a:ea typeface="+mn-ea"/>
+        <a:cs typeface="+mn-cs"/>
+      </a:defRPr>
+    </a:lvl4pPr>
+    <a:lvl5pPr marL="1828800" algn="l" defTabSz="914400" rtl="0" eaLnBrk="1" latinLnBrk="0" hangingPunct="1">
+      <a:defRPr sz="1200" kern="1200">
+        <a:solidFill>
+          <a:schemeClr val="tx1"/>
+        </a:solidFill>
+        <a:latin typeface="+mn-lt"/>
+        <a:ea typeface="+mn-ea"/>
+        <a:cs typeface="+mn-cs"/>
+      </a:defRPr>
+    </a:lvl5pPr>
+    <a:lvl6pPr marL="2286000" algn="l" defTabSz="914400" rtl="0" eaLnBrk="1" latinLnBrk="0" hangingPunct="1">
+      <a:defRPr sz="1200" kern="1200">
+        <a:solidFill>
+          <a:schemeClr val="tx1"/>
+        </a:solidFill>
+        <a:latin typeface="+mn-lt"/>
+        <a:ea typeface="+mn-ea"/>
+        <a:cs typeface="+mn-cs"/>
+      </a:defRPr>
+    </a:lvl6pPr>
+    <a:lvl7pPr marL="2743200" algn="l" defTabSz="914400" rtl="0" eaLnBrk="1" latinLnBrk="0" hangingPunct="1">
+      <a:defRPr sz="1200" kern="1200">
+        <a:solidFill>
+          <a:schemeClr val="tx1"/>
+        </a:solidFill>
+        <a:latin typeface="+mn-lt"/>
+        <a:ea typeface="+mn-ea"/>
+        <a:cs typeface="+mn-cs"/>
+      </a:defRPr>
+    </a:lvl7pPr>
+    <a:lvl8pPr marL="3200400" algn="l" defTabSz="914400" rtl="0" eaLnBrk="1" latinLnBrk="0" hangingPunct="1">
+      <a:defRPr sz="1200" kern="1200">
+        <a:solidFill>
+          <a:schemeClr val="tx1"/>
+        </a:solidFill>
+        <a:latin typeface="+mn-lt"/>
+        <a:ea typeface="+mn-ea"/>
+        <a:cs typeface="+mn-cs"/>
+      </a:defRPr>
+    </a:lvl8pPr>
+    <a:lvl9pPr marL="3657600" algn="l" defTabSz="914400" rtl="0" eaLnBrk="1" latinLnBrk="0" hangingPunct="1">
+      <a:defRPr sz="1200" kern="1200">
+        <a:solidFill>
+          <a:schemeClr val="tx1"/>
+        </a:solidFill>
+        <a:latin typeface="+mn-lt"/>
+        <a:ea typeface="+mn-ea"/>
+        <a:cs typeface="+mn-cs"/>
+      </a:defRPr>
+    </a:lvl9pPr>
+  </p:notesStyle>
+</p:notesMaster>
 </file>
 
 <file path=ppt/slideLayouts/slideLayout1.xml><?xml version="1.0" encoding="utf-8"?>
@@ -150,10 +509,9 @@
           </a:lstStyle>
           <a:p>
             <a:r>
-              <a:rPr lang="pt-BR" smtClean="0"/>
+              <a:rPr lang="pt-BR"/>
               <a:t>Clique para editar o título mestre</a:t>
             </a:r>
-            <a:endParaRPr lang="pt-BR"/>
           </a:p>
         </p:txBody>
       </p:sp>
@@ -215,10 +573,9 @@
           </a:lstStyle>
           <a:p>
             <a:r>
-              <a:rPr lang="pt-BR" smtClean="0"/>
+              <a:rPr lang="pt-BR"/>
               <a:t>Clique para editar o estilo do subtítulo Mestre</a:t>
             </a:r>
-            <a:endParaRPr lang="pt-BR"/>
           </a:p>
         </p:txBody>
       </p:sp>
@@ -335,10 +692,9 @@
           <a:lstStyle/>
           <a:p>
             <a:r>
-              <a:rPr lang="pt-BR" smtClean="0"/>
+              <a:rPr lang="pt-BR"/>
               <a:t>Clique para editar o título mestre</a:t>
             </a:r>
-            <a:endParaRPr lang="pt-BR"/>
           </a:p>
         </p:txBody>
       </p:sp>
@@ -359,38 +715,37 @@
           <a:p>
             <a:pPr lvl="0"/>
             <a:r>
-              <a:rPr lang="pt-BR" smtClean="0"/>
+              <a:rPr lang="pt-BR"/>
               <a:t>Editar estilos de texto Mestre</a:t>
             </a:r>
           </a:p>
           <a:p>
             <a:pPr lvl="1"/>
             <a:r>
-              <a:rPr lang="pt-BR" smtClean="0"/>
+              <a:rPr lang="pt-BR"/>
               <a:t>Segundo nível</a:t>
             </a:r>
           </a:p>
           <a:p>
             <a:pPr lvl="2"/>
             <a:r>
-              <a:rPr lang="pt-BR" smtClean="0"/>
+              <a:rPr lang="pt-BR"/>
               <a:t>Terceiro nível</a:t>
             </a:r>
           </a:p>
           <a:p>
             <a:pPr lvl="3"/>
             <a:r>
-              <a:rPr lang="pt-BR" smtClean="0"/>
+              <a:rPr lang="pt-BR"/>
               <a:t>Quarto nível</a:t>
             </a:r>
           </a:p>
           <a:p>
             <a:pPr lvl="4"/>
             <a:r>
-              <a:rPr lang="pt-BR" smtClean="0"/>
+              <a:rPr lang="pt-BR"/>
               <a:t>Quinto nível</a:t>
             </a:r>
-            <a:endParaRPr lang="pt-BR"/>
           </a:p>
         </p:txBody>
       </p:sp>
@@ -512,10 +867,9 @@
           <a:lstStyle/>
           <a:p>
             <a:r>
-              <a:rPr lang="pt-BR" smtClean="0"/>
+              <a:rPr lang="pt-BR"/>
               <a:t>Clique para editar o título mestre</a:t>
             </a:r>
-            <a:endParaRPr lang="pt-BR"/>
           </a:p>
         </p:txBody>
       </p:sp>
@@ -541,38 +895,37 @@
           <a:p>
             <a:pPr lvl="0"/>
             <a:r>
-              <a:rPr lang="pt-BR" smtClean="0"/>
+              <a:rPr lang="pt-BR"/>
               <a:t>Editar estilos de texto Mestre</a:t>
             </a:r>
           </a:p>
           <a:p>
             <a:pPr lvl="1"/>
             <a:r>
-              <a:rPr lang="pt-BR" smtClean="0"/>
+              <a:rPr lang="pt-BR"/>
               <a:t>Segundo nível</a:t>
             </a:r>
           </a:p>
           <a:p>
             <a:pPr lvl="2"/>
             <a:r>
-              <a:rPr lang="pt-BR" smtClean="0"/>
+              <a:rPr lang="pt-BR"/>
               <a:t>Terceiro nível</a:t>
             </a:r>
           </a:p>
           <a:p>
             <a:pPr lvl="3"/>
             <a:r>
-              <a:rPr lang="pt-BR" smtClean="0"/>
+              <a:rPr lang="pt-BR"/>
               <a:t>Quarto nível</a:t>
             </a:r>
           </a:p>
           <a:p>
             <a:pPr lvl="4"/>
             <a:r>
-              <a:rPr lang="pt-BR" smtClean="0"/>
+              <a:rPr lang="pt-BR"/>
               <a:t>Quinto nível</a:t>
             </a:r>
-            <a:endParaRPr lang="pt-BR"/>
           </a:p>
         </p:txBody>
       </p:sp>
@@ -689,10 +1042,9 @@
           <a:lstStyle/>
           <a:p>
             <a:r>
-              <a:rPr lang="pt-BR" smtClean="0"/>
+              <a:rPr lang="pt-BR"/>
               <a:t>Clique para editar o título mestre</a:t>
             </a:r>
-            <a:endParaRPr lang="pt-BR"/>
           </a:p>
         </p:txBody>
       </p:sp>
@@ -713,38 +1065,37 @@
           <a:p>
             <a:pPr lvl="0"/>
             <a:r>
-              <a:rPr lang="pt-BR" smtClean="0"/>
+              <a:rPr lang="pt-BR"/>
               <a:t>Editar estilos de texto Mestre</a:t>
             </a:r>
           </a:p>
           <a:p>
             <a:pPr lvl="1"/>
             <a:r>
-              <a:rPr lang="pt-BR" smtClean="0"/>
+              <a:rPr lang="pt-BR"/>
               <a:t>Segundo nível</a:t>
             </a:r>
           </a:p>
           <a:p>
             <a:pPr lvl="2"/>
             <a:r>
-              <a:rPr lang="pt-BR" smtClean="0"/>
+              <a:rPr lang="pt-BR"/>
               <a:t>Terceiro nível</a:t>
             </a:r>
           </a:p>
           <a:p>
             <a:pPr lvl="3"/>
             <a:r>
-              <a:rPr lang="pt-BR" smtClean="0"/>
+              <a:rPr lang="pt-BR"/>
               <a:t>Quarto nível</a:t>
             </a:r>
           </a:p>
           <a:p>
             <a:pPr lvl="4"/>
             <a:r>
-              <a:rPr lang="pt-BR" smtClean="0"/>
+              <a:rPr lang="pt-BR"/>
               <a:t>Quinto nível</a:t>
             </a:r>
-            <a:endParaRPr lang="pt-BR"/>
           </a:p>
         </p:txBody>
       </p:sp>
@@ -870,10 +1221,9 @@
           </a:lstStyle>
           <a:p>
             <a:r>
-              <a:rPr lang="pt-BR" smtClean="0"/>
+              <a:rPr lang="pt-BR"/>
               <a:t>Clique para editar o título mestre</a:t>
             </a:r>
-            <a:endParaRPr lang="pt-BR"/>
           </a:p>
         </p:txBody>
       </p:sp>
@@ -990,7 +1340,7 @@
           <a:p>
             <a:pPr lvl="0"/>
             <a:r>
-              <a:rPr lang="pt-BR" smtClean="0"/>
+              <a:rPr lang="pt-BR"/>
               <a:t>Editar estilos de texto Mestre</a:t>
             </a:r>
           </a:p>
@@ -1109,10 +1459,9 @@
           <a:lstStyle/>
           <a:p>
             <a:r>
-              <a:rPr lang="pt-BR" smtClean="0"/>
+              <a:rPr lang="pt-BR"/>
               <a:t>Clique para editar o título mestre</a:t>
             </a:r>
-            <a:endParaRPr lang="pt-BR"/>
           </a:p>
         </p:txBody>
       </p:sp>
@@ -1138,38 +1487,37 @@
           <a:p>
             <a:pPr lvl="0"/>
             <a:r>
-              <a:rPr lang="pt-BR" smtClean="0"/>
+              <a:rPr lang="pt-BR"/>
               <a:t>Editar estilos de texto Mestre</a:t>
             </a:r>
           </a:p>
           <a:p>
             <a:pPr lvl="1"/>
             <a:r>
-              <a:rPr lang="pt-BR" smtClean="0"/>
+              <a:rPr lang="pt-BR"/>
               <a:t>Segundo nível</a:t>
             </a:r>
           </a:p>
           <a:p>
             <a:pPr lvl="2"/>
             <a:r>
-              <a:rPr lang="pt-BR" smtClean="0"/>
+              <a:rPr lang="pt-BR"/>
               <a:t>Terceiro nível</a:t>
             </a:r>
           </a:p>
           <a:p>
             <a:pPr lvl="3"/>
             <a:r>
-              <a:rPr lang="pt-BR" smtClean="0"/>
+              <a:rPr lang="pt-BR"/>
               <a:t>Quarto nível</a:t>
             </a:r>
           </a:p>
           <a:p>
             <a:pPr lvl="4"/>
             <a:r>
-              <a:rPr lang="pt-BR" smtClean="0"/>
+              <a:rPr lang="pt-BR"/>
               <a:t>Quinto nível</a:t>
             </a:r>
-            <a:endParaRPr lang="pt-BR"/>
           </a:p>
         </p:txBody>
       </p:sp>
@@ -1195,38 +1543,37 @@
           <a:p>
             <a:pPr lvl="0"/>
             <a:r>
-              <a:rPr lang="pt-BR" smtClean="0"/>
+              <a:rPr lang="pt-BR"/>
               <a:t>Editar estilos de texto Mestre</a:t>
             </a:r>
           </a:p>
           <a:p>
             <a:pPr lvl="1"/>
             <a:r>
-              <a:rPr lang="pt-BR" smtClean="0"/>
+              <a:rPr lang="pt-BR"/>
               <a:t>Segundo nível</a:t>
             </a:r>
           </a:p>
           <a:p>
             <a:pPr lvl="2"/>
             <a:r>
-              <a:rPr lang="pt-BR" smtClean="0"/>
+              <a:rPr lang="pt-BR"/>
               <a:t>Terceiro nível</a:t>
             </a:r>
           </a:p>
           <a:p>
             <a:pPr lvl="3"/>
             <a:r>
-              <a:rPr lang="pt-BR" smtClean="0"/>
+              <a:rPr lang="pt-BR"/>
               <a:t>Quarto nível</a:t>
             </a:r>
           </a:p>
           <a:p>
             <a:pPr lvl="4"/>
             <a:r>
-              <a:rPr lang="pt-BR" smtClean="0"/>
+              <a:rPr lang="pt-BR"/>
               <a:t>Quinto nível</a:t>
             </a:r>
-            <a:endParaRPr lang="pt-BR"/>
           </a:p>
         </p:txBody>
       </p:sp>
@@ -1348,10 +1695,9 @@
           <a:lstStyle/>
           <a:p>
             <a:r>
-              <a:rPr lang="pt-BR" smtClean="0"/>
+              <a:rPr lang="pt-BR"/>
               <a:t>Clique para editar o título mestre</a:t>
             </a:r>
-            <a:endParaRPr lang="pt-BR"/>
           </a:p>
         </p:txBody>
       </p:sp>
@@ -1414,7 +1760,7 @@
           <a:p>
             <a:pPr lvl="0"/>
             <a:r>
-              <a:rPr lang="pt-BR" smtClean="0"/>
+              <a:rPr lang="pt-BR"/>
               <a:t>Editar estilos de texto Mestre</a:t>
             </a:r>
           </a:p>
@@ -1442,38 +1788,37 @@
           <a:p>
             <a:pPr lvl="0"/>
             <a:r>
-              <a:rPr lang="pt-BR" smtClean="0"/>
+              <a:rPr lang="pt-BR"/>
               <a:t>Editar estilos de texto Mestre</a:t>
             </a:r>
           </a:p>
           <a:p>
             <a:pPr lvl="1"/>
             <a:r>
-              <a:rPr lang="pt-BR" smtClean="0"/>
+              <a:rPr lang="pt-BR"/>
               <a:t>Segundo nível</a:t>
             </a:r>
           </a:p>
           <a:p>
             <a:pPr lvl="2"/>
             <a:r>
-              <a:rPr lang="pt-BR" smtClean="0"/>
+              <a:rPr lang="pt-BR"/>
               <a:t>Terceiro nível</a:t>
             </a:r>
           </a:p>
           <a:p>
             <a:pPr lvl="3"/>
             <a:r>
-              <a:rPr lang="pt-BR" smtClean="0"/>
+              <a:rPr lang="pt-BR"/>
               <a:t>Quarto nível</a:t>
             </a:r>
           </a:p>
           <a:p>
             <a:pPr lvl="4"/>
             <a:r>
-              <a:rPr lang="pt-BR" smtClean="0"/>
+              <a:rPr lang="pt-BR"/>
               <a:t>Quinto nível</a:t>
             </a:r>
-            <a:endParaRPr lang="pt-BR"/>
           </a:p>
         </p:txBody>
       </p:sp>
@@ -1536,7 +1881,7 @@
           <a:p>
             <a:pPr lvl="0"/>
             <a:r>
-              <a:rPr lang="pt-BR" smtClean="0"/>
+              <a:rPr lang="pt-BR"/>
               <a:t>Editar estilos de texto Mestre</a:t>
             </a:r>
           </a:p>
@@ -1564,38 +1909,37 @@
           <a:p>
             <a:pPr lvl="0"/>
             <a:r>
-              <a:rPr lang="pt-BR" smtClean="0"/>
+              <a:rPr lang="pt-BR"/>
               <a:t>Editar estilos de texto Mestre</a:t>
             </a:r>
           </a:p>
           <a:p>
             <a:pPr lvl="1"/>
             <a:r>
-              <a:rPr lang="pt-BR" smtClean="0"/>
+              <a:rPr lang="pt-BR"/>
               <a:t>Segundo nível</a:t>
             </a:r>
           </a:p>
           <a:p>
             <a:pPr lvl="2"/>
             <a:r>
-              <a:rPr lang="pt-BR" smtClean="0"/>
+              <a:rPr lang="pt-BR"/>
               <a:t>Terceiro nível</a:t>
             </a:r>
           </a:p>
           <a:p>
             <a:pPr lvl="3"/>
             <a:r>
-              <a:rPr lang="pt-BR" smtClean="0"/>
+              <a:rPr lang="pt-BR"/>
               <a:t>Quarto nível</a:t>
             </a:r>
           </a:p>
           <a:p>
             <a:pPr lvl="4"/>
             <a:r>
-              <a:rPr lang="pt-BR" smtClean="0"/>
+              <a:rPr lang="pt-BR"/>
               <a:t>Quinto nível</a:t>
             </a:r>
-            <a:endParaRPr lang="pt-BR"/>
           </a:p>
         </p:txBody>
       </p:sp>
@@ -1712,10 +2056,9 @@
           <a:lstStyle/>
           <a:p>
             <a:r>
-              <a:rPr lang="pt-BR" smtClean="0"/>
+              <a:rPr lang="pt-BR"/>
               <a:t>Clique para editar o título mestre</a:t>
             </a:r>
-            <a:endParaRPr lang="pt-BR"/>
           </a:p>
         </p:txBody>
       </p:sp>
@@ -1938,10 +2281,9 @@
           </a:lstStyle>
           <a:p>
             <a:r>
-              <a:rPr lang="pt-BR" smtClean="0"/>
+              <a:rPr lang="pt-BR"/>
               <a:t>Clique para editar o título mestre</a:t>
             </a:r>
-            <a:endParaRPr lang="pt-BR"/>
           </a:p>
         </p:txBody>
       </p:sp>
@@ -1995,38 +2337,37 @@
           <a:p>
             <a:pPr lvl="0"/>
             <a:r>
-              <a:rPr lang="pt-BR" smtClean="0"/>
+              <a:rPr lang="pt-BR"/>
               <a:t>Editar estilos de texto Mestre</a:t>
             </a:r>
           </a:p>
           <a:p>
             <a:pPr lvl="1"/>
             <a:r>
-              <a:rPr lang="pt-BR" smtClean="0"/>
+              <a:rPr lang="pt-BR"/>
               <a:t>Segundo nível</a:t>
             </a:r>
           </a:p>
           <a:p>
             <a:pPr lvl="2"/>
             <a:r>
-              <a:rPr lang="pt-BR" smtClean="0"/>
+              <a:rPr lang="pt-BR"/>
               <a:t>Terceiro nível</a:t>
             </a:r>
           </a:p>
           <a:p>
             <a:pPr lvl="3"/>
             <a:r>
-              <a:rPr lang="pt-BR" smtClean="0"/>
+              <a:rPr lang="pt-BR"/>
               <a:t>Quarto nível</a:t>
             </a:r>
           </a:p>
           <a:p>
             <a:pPr lvl="4"/>
             <a:r>
-              <a:rPr lang="pt-BR" smtClean="0"/>
+              <a:rPr lang="pt-BR"/>
               <a:t>Quinto nível</a:t>
             </a:r>
-            <a:endParaRPr lang="pt-BR"/>
           </a:p>
         </p:txBody>
       </p:sp>
@@ -2089,7 +2430,7 @@
           <a:p>
             <a:pPr lvl="0"/>
             <a:r>
-              <a:rPr lang="pt-BR" smtClean="0"/>
+              <a:rPr lang="pt-BR"/>
               <a:t>Editar estilos de texto Mestre</a:t>
             </a:r>
           </a:p>
@@ -2217,10 +2558,9 @@
           </a:lstStyle>
           <a:p>
             <a:r>
-              <a:rPr lang="pt-BR" smtClean="0"/>
+              <a:rPr lang="pt-BR"/>
               <a:t>Clique para editar o título mestre</a:t>
             </a:r>
-            <a:endParaRPr lang="pt-BR"/>
           </a:p>
         </p:txBody>
       </p:sp>
@@ -2344,7 +2684,7 @@
           <a:p>
             <a:pPr lvl="0"/>
             <a:r>
-              <a:rPr lang="pt-BR" smtClean="0"/>
+              <a:rPr lang="pt-BR"/>
               <a:t>Editar estilos de texto Mestre</a:t>
             </a:r>
           </a:p>
@@ -2478,10 +2818,9 @@
           <a:lstStyle/>
           <a:p>
             <a:r>
-              <a:rPr lang="pt-BR" smtClean="0"/>
+              <a:rPr lang="pt-BR"/>
               <a:t>Clique para editar o título mestre</a:t>
             </a:r>
-            <a:endParaRPr lang="pt-BR"/>
           </a:p>
         </p:txBody>
       </p:sp>
@@ -2512,38 +2851,37 @@
           <a:p>
             <a:pPr lvl="0"/>
             <a:r>
-              <a:rPr lang="pt-BR" smtClean="0"/>
+              <a:rPr lang="pt-BR"/>
               <a:t>Editar estilos de texto Mestre</a:t>
             </a:r>
           </a:p>
           <a:p>
             <a:pPr lvl="1"/>
             <a:r>
-              <a:rPr lang="pt-BR" smtClean="0"/>
+              <a:rPr lang="pt-BR"/>
               <a:t>Segundo nível</a:t>
             </a:r>
           </a:p>
           <a:p>
             <a:pPr lvl="2"/>
             <a:r>
-              <a:rPr lang="pt-BR" smtClean="0"/>
+              <a:rPr lang="pt-BR"/>
               <a:t>Terceiro nível</a:t>
             </a:r>
           </a:p>
           <a:p>
             <a:pPr lvl="3"/>
             <a:r>
-              <a:rPr lang="pt-BR" smtClean="0"/>
+              <a:rPr lang="pt-BR"/>
               <a:t>Quarto nível</a:t>
             </a:r>
           </a:p>
           <a:p>
             <a:pPr lvl="4"/>
             <a:r>
-              <a:rPr lang="pt-BR" smtClean="0"/>
+              <a:rPr lang="pt-BR"/>
               <a:t>Quinto nível</a:t>
             </a:r>
-            <a:endParaRPr lang="pt-BR"/>
           </a:p>
         </p:txBody>
       </p:sp>
@@ -3023,7 +3361,7 @@
         </p:blipFill>
         <p:spPr>
           <a:xfrm>
-            <a:off x="1364566" y="17811"/>
+            <a:off x="1364566" y="0"/>
             <a:ext cx="10827434" cy="6840189"/>
           </a:xfrm>
           <a:prstGeom prst="rect">
@@ -3052,16 +3390,15 @@
           <a:lstStyle/>
           <a:p>
             <a:r>
-              <a:rPr lang="pt-BR" dirty="0" smtClean="0">
+              <a:rPr lang="pt-BR" dirty="0">
                 <a:latin typeface="Baskerville Old Face" panose="02020602080505020303" pitchFamily="18" charset="0"/>
               </a:rPr>
               <a:t>Larry Page</a:t>
             </a:r>
             <a:r>
-              <a:rPr lang="pt-BR" dirty="0" smtClean="0"/>
+              <a:rPr lang="pt-BR" dirty="0"/>
               <a:t>	</a:t>
             </a:r>
-            <a:endParaRPr lang="pt-BR" dirty="0"/>
           </a:p>
         </p:txBody>
       </p:sp>
@@ -3077,13 +3414,13 @@
         </p:nvSpPr>
         <p:spPr>
           <a:xfrm>
-            <a:off x="300110" y="4065608"/>
-            <a:ext cx="9144000" cy="1655762"/>
+            <a:off x="437321" y="3633770"/>
+            <a:ext cx="9218824" cy="1655762"/>
           </a:xfrm>
         </p:spPr>
         <p:txBody>
           <a:bodyPr>
-            <a:normAutofit fontScale="92500" lnSpcReduction="10000"/>
+            <a:normAutofit/>
           </a:bodyPr>
           <a:lstStyle/>
           <a:p>
@@ -3092,8 +3429,11 @@
               <a:buChar char="•"/>
             </a:pPr>
             <a:r>
-              <a:rPr lang="pt-BR" dirty="0" smtClean="0"/>
-              <a:t>46 Anos </a:t>
+              <a:rPr lang="pt-BR" dirty="0">
+                <a:latin typeface="Bahnschrift Light Condensed" panose="020B0502040204020203" pitchFamily="34" charset="0"/>
+                <a:cs typeface="Arabic Typesetting" panose="020B0604020202020204" pitchFamily="66" charset="-78"/>
+              </a:rPr>
+              <a:t>10º Homem mais rico  do mundo</a:t>
             </a:r>
           </a:p>
           <a:p>
@@ -3102,8 +3442,32 @@
               <a:buChar char="•"/>
             </a:pPr>
             <a:r>
-              <a:rPr lang="pt-BR" dirty="0" smtClean="0"/>
-              <a:t>10º Homem mais rico  do mundo</a:t>
+              <a:rPr lang="pt-BR" dirty="0">
+                <a:latin typeface="Bahnschrift Light Condensed" panose="020B0502040204020203" pitchFamily="34" charset="0"/>
+                <a:cs typeface="Arabic Typesetting" panose="020B0604020202020204" pitchFamily="66" charset="-78"/>
+              </a:rPr>
+              <a:t>U$50,8 Bilhões  </a:t>
+            </a:r>
+            <a:r>
+              <a:rPr lang="pt-BR" sz="2600" dirty="0">
+                <a:latin typeface="Bahnschrift Light Condensed" panose="020B0502040204020203" pitchFamily="34" charset="0"/>
+                <a:cs typeface="Arabic Typesetting" panose="020B0604020202020204" pitchFamily="66" charset="-78"/>
+              </a:rPr>
+              <a:t>(</a:t>
+            </a:r>
+            <a:r>
+              <a:rPr lang="pt-BR" sz="2200" dirty="0">
+                <a:latin typeface="Bahnschrift Light Condensed" panose="020B0502040204020203" pitchFamily="34" charset="0"/>
+                <a:cs typeface="Arabic Typesetting" panose="020B0604020202020204" pitchFamily="66" charset="-78"/>
+              </a:rPr>
+              <a:t>Revista Forbes</a:t>
+            </a:r>
+            <a:r>
+              <a:rPr lang="pt-BR" sz="2600" dirty="0">
+                <a:latin typeface="Bahnschrift Light Condensed" panose="020B0502040204020203" pitchFamily="34" charset="0"/>
+                <a:cs typeface="Arabic Typesetting" panose="020B0604020202020204" pitchFamily="66" charset="-78"/>
+              </a:rPr>
+              <a:t>)</a:t>
             </a:r>
           </a:p>
           <a:p>
@@ -3112,41 +3476,86 @@
               <a:buChar char="•"/>
             </a:pPr>
             <a:r>
-              <a:rPr lang="pt-BR" dirty="0" smtClean="0"/>
-              <a:t>U$50,8 Bilhões  </a:t>
-            </a:r>
-            <a:r>
-              <a:rPr lang="pt-BR" sz="2600" dirty="0" smtClean="0"/>
-              <a:t>(</a:t>
-            </a:r>
-            <a:r>
-              <a:rPr lang="pt-BR" sz="2200" dirty="0" smtClean="0"/>
-              <a:t>Revista Forbes</a:t>
-            </a:r>
-            <a:r>
-              <a:rPr lang="pt-BR" sz="2600" dirty="0" smtClean="0"/>
-              <a:t>)</a:t>
-            </a:r>
-          </a:p>
-          <a:p>
-            <a:pPr marL="342900" indent="-342900" algn="l">
-              <a:buFont typeface="Arial" panose="020B0604020202020204" pitchFamily="34" charset="0"/>
-              <a:buChar char="•"/>
-            </a:pPr>
-            <a:r>
-              <a:rPr lang="pt-BR" dirty="0" err="1" smtClean="0"/>
-              <a:t>Cofundador</a:t>
-            </a:r>
-            <a:r>
-              <a:rPr lang="pt-BR" dirty="0" smtClean="0"/>
-              <a:t>  do Google</a:t>
-            </a:r>
-          </a:p>
-          <a:p>
-            <a:pPr marL="342900" indent="-342900" algn="l">
-              <a:buFont typeface="Arial" panose="020B0604020202020204" pitchFamily="34" charset="0"/>
-              <a:buChar char="•"/>
-            </a:pPr>
+              <a:rPr lang="pt-BR" dirty="0">
+                <a:latin typeface="Bahnschrift Light Condensed" panose="020B0502040204020203" pitchFamily="34" charset="0"/>
+                <a:cs typeface="Arabic Typesetting" panose="020B0604020202020204" pitchFamily="66" charset="-78"/>
+              </a:rPr>
+              <a:t>Engenheiro de Software renomado</a:t>
+            </a:r>
+          </a:p>
+          <a:p>
+            <a:pPr algn="l"/>
+            <a:endParaRPr lang="pt-BR" dirty="0">
+              <a:latin typeface="Bahnschrift Light Condensed" panose="020B0502040204020203" pitchFamily="34" charset="0"/>
+              <a:cs typeface="Arabic Typesetting" panose="020B0604020202020204" pitchFamily="66" charset="-78"/>
+            </a:endParaRPr>
+          </a:p>
+        </p:txBody>
+      </p:sp>
+      <p:sp>
+        <p:nvSpPr>
+          <p:cNvPr id="4" name="CaixaDeTexto 3">
+            <a:extLst>
+              <a:ext uri="{FF2B5EF4-FFF2-40B4-BE49-F238E27FC236}">
+                <a16:creationId xmlns:a16="http://schemas.microsoft.com/office/drawing/2014/main" id="{EE658030-9D35-4099-B7FE-A7145AC95CFC}"/>
+              </a:ext>
+            </a:extLst>
+          </p:cNvPr>
+          <p:cNvSpPr txBox="1"/>
+          <p:nvPr/>
+        </p:nvSpPr>
+        <p:spPr>
+          <a:xfrm>
+            <a:off x="1364566" y="2277639"/>
+            <a:ext cx="3426707" cy="1200329"/>
+          </a:xfrm>
+          <a:prstGeom prst="rect">
+            <a:avLst/>
+          </a:prstGeom>
+          <a:noFill/>
+        </p:spPr>
+        <p:txBody>
+          <a:bodyPr wrap="square" rtlCol="0">
+            <a:spAutoFit/>
+          </a:bodyPr>
+          <a:lstStyle/>
+          <a:p>
+            <a:r>
+              <a:rPr lang="pt-BR" b="1" dirty="0"/>
+              <a:t>Lawrence</a:t>
+            </a:r>
+            <a:r>
+              <a:rPr lang="pt-BR" dirty="0"/>
+              <a:t> Edward </a:t>
+            </a:r>
+            <a:r>
+              <a:rPr lang="pt-BR" b="1" dirty="0"/>
+              <a:t>Page   </a:t>
+            </a:r>
+          </a:p>
+          <a:p>
+            <a:r>
+              <a:rPr lang="pt-BR" b="1" dirty="0">
+                <a:cs typeface="Arabic Typesetting" panose="020B0604020202020204" pitchFamily="66" charset="-78"/>
+              </a:rPr>
+              <a:t>             </a:t>
+            </a:r>
+          </a:p>
+          <a:p>
+            <a:r>
+              <a:rPr lang="pt-BR" b="1" dirty="0">
+                <a:cs typeface="Arabic Typesetting" panose="020B0604020202020204" pitchFamily="66" charset="-78"/>
+              </a:rPr>
+              <a:t>              </a:t>
+            </a:r>
+            <a:r>
+              <a:rPr lang="pt-BR" dirty="0">
+                <a:cs typeface="Arabic Typesetting" panose="020B0604020202020204" pitchFamily="66" charset="-78"/>
+              </a:rPr>
+              <a:t>46 Anos </a:t>
+            </a:r>
+          </a:p>
+          <a:p>
             <a:endParaRPr lang="pt-BR" dirty="0"/>
           </a:p>
         </p:txBody>
@@ -3167,6 +3576,14 @@
 <file path=ppt/slides/slide2.xml><?xml version="1.0" encoding="utf-8"?>
 <p:sld xmlns:a="http://schemas.openxmlformats.org/drawingml/2006/main" xmlns:r="http://schemas.openxmlformats.org/officeDocument/2006/relationships" xmlns:p="http://schemas.openxmlformats.org/presentationml/2006/main">
   <p:cSld>
+    <p:bg>
+      <p:bgPr>
+        <a:solidFill>
+          <a:schemeClr val="bg1"/>
+        </a:solidFill>
+        <a:effectLst/>
+      </p:bgPr>
+    </p:bg>
     <p:spTree>
       <p:nvGrpSpPr>
         <p:cNvPr id="1" name=""/>
@@ -3193,12 +3610,9 @@
         </p:nvSpPr>
         <p:spPr>
           <a:xfrm>
-            <a:off x="6625883" y="4024529"/>
-            <a:ext cx="5669281" cy="1473569"/>
+            <a:off x="655320" y="365125"/>
+            <a:ext cx="5120114" cy="1692794"/>
           </a:xfrm>
-          <a:effectLst>
-            <a:softEdge rad="63500"/>
-          </a:effectLst>
         </p:spPr>
         <p:txBody>
           <a:bodyPr>
@@ -3206,33 +3620,80 @@
           </a:bodyPr>
           <a:lstStyle/>
           <a:p>
-            <a:pPr algn="ctr"/>
-            <a:r>
-              <a:rPr lang="pt-BR" sz="2400" dirty="0" smtClean="0"/>
-              <a:t>“Inventar </a:t>
-            </a:r>
-            <a:r>
-              <a:rPr lang="pt-BR" sz="2400" dirty="0"/>
-              <a:t>não é o suficiente, você tem que levar para as pessoas e ter certeza de que elas podem utilizar”</a:t>
-            </a:r>
-            <a:endParaRPr lang="pt-BR" sz="1800" dirty="0"/>
-          </a:p>
-        </p:txBody>
-      </p:sp>
-      <p:sp>
-        <p:nvSpPr>
-          <p:cNvPr id="3" name="Espaço Reservado para Conteúdo 2"/>
-          <p:cNvSpPr>
-            <a:spLocks noGrp="1"/>
-          </p:cNvSpPr>
-          <p:nvPr>
-            <p:ph idx="1"/>
-          </p:nvPr>
-        </p:nvSpPr>
+            <a:r>
+              <a:rPr lang="pt-BR" sz="2800"/>
+              <a:t>“Inventar não é o suficiente, você tem que levar para as pessoas e ter certeza de que elas podem utilizar”</a:t>
+            </a:r>
+          </a:p>
+        </p:txBody>
+      </p:sp>
+      <p:cxnSp>
+        <p:nvCxnSpPr>
+          <p:cNvPr id="71" name="Straight Arrow Connector 70">
+            <a:extLst>
+              <a:ext uri="{FF2B5EF4-FFF2-40B4-BE49-F238E27FC236}">
+                <a16:creationId xmlns:a16="http://schemas.microsoft.com/office/drawing/2014/main" id="{E4A809D5-3600-46D4-A466-67F2349A54FB}"/>
+              </a:ext>
+              <a:ext uri="{C183D7F6-B498-43B3-948B-1728B52AA6E4}">
+                <adec:decorative xmlns:adec="http://schemas.microsoft.com/office/drawing/2017/decorative" val="1"/>
+              </a:ext>
+            </a:extLst>
+          </p:cNvPr>
+          <p:cNvCxnSpPr>
+            <a:cxnSpLocks noGrp="1" noRot="1" noChangeAspect="1" noMove="1" noResize="1" noEditPoints="1" noAdjustHandles="1" noChangeArrowheads="1" noChangeShapeType="1"/>
+          </p:cNvCxnSpPr>
+          <p:nvPr>
+            <p:extLst>
+              <p:ext uri="{386F3935-93C4-4BCD-93E2-E3B085C9AB24}">
+                <p16:designElem xmlns:p16="http://schemas.microsoft.com/office/powerpoint/2015/main" val="1"/>
+              </p:ext>
+            </p:extLst>
+          </p:nvPr>
+        </p:nvCxnSpPr>
         <p:spPr>
           <a:xfrm>
-            <a:off x="275493" y="1713084"/>
-            <a:ext cx="10515600" cy="4351338"/>
+            <a:off x="655320" y="2316480"/>
+            <a:ext cx="4572000" cy="0"/>
+          </a:xfrm>
+          <a:prstGeom prst="straightConnector1">
+            <a:avLst/>
+          </a:prstGeom>
+          <a:ln w="19050" cap="sq">
+            <a:solidFill>
+              <a:schemeClr val="tx1"/>
+            </a:solidFill>
+            <a:tailEnd type="none"/>
+          </a:ln>
+        </p:spPr>
+        <p:style>
+          <a:lnRef idx="1">
+            <a:schemeClr val="accent1"/>
+          </a:lnRef>
+          <a:fillRef idx="0">
+            <a:schemeClr val="accent1"/>
+          </a:fillRef>
+          <a:effectRef idx="0">
+            <a:schemeClr val="accent1"/>
+          </a:effectRef>
+          <a:fontRef idx="minor">
+            <a:schemeClr val="tx1"/>
+          </a:fontRef>
+        </p:style>
+      </p:cxnSp>
+      <p:sp>
+        <p:nvSpPr>
+          <p:cNvPr id="3" name="Espaço Reservado para Conteúdo 2"/>
+          <p:cNvSpPr>
+            <a:spLocks noGrp="1"/>
+          </p:cNvSpPr>
+          <p:nvPr>
+            <p:ph idx="1"/>
+          </p:nvPr>
+        </p:nvSpPr>
+        <p:spPr>
+          <a:xfrm>
+            <a:off x="655321" y="2575034"/>
+            <a:ext cx="6491067" cy="3462228"/>
           </a:xfrm>
         </p:spPr>
         <p:txBody>
@@ -3241,33 +3702,60 @@
           </a:bodyPr>
           <a:lstStyle/>
           <a:p>
-            <a:r>
-              <a:rPr lang="pt-BR" sz="2400" dirty="0">
+            <a:pPr marL="0" indent="0">
+              <a:buNone/>
+            </a:pPr>
+            <a:r>
+              <a:rPr lang="pt-BR" sz="1800" dirty="0">
                 <a:latin typeface="+mj-lt"/>
               </a:rPr>
-              <a:t>12 Anos: </a:t>
-            </a:r>
-            <a:r>
-              <a:rPr lang="pt-BR" sz="2400" dirty="0" smtClean="0">
+              <a:t>     Filhos de Pais programadores </a:t>
+            </a:r>
+          </a:p>
+          <a:p>
+            <a:pPr marL="0" indent="0">
+              <a:buNone/>
+            </a:pPr>
+            <a:r>
+              <a:rPr lang="pt-BR" sz="1800" dirty="0">
                 <a:latin typeface="+mj-lt"/>
               </a:rPr>
-              <a:t>Leu a biografia completa de </a:t>
-            </a:r>
-            <a:r>
-              <a:rPr lang="pt-BR" sz="2400" dirty="0" err="1" smtClean="0">
+              <a:t>    6 Anos - Brincava com linhas de código</a:t>
+            </a:r>
+          </a:p>
+          <a:p>
+            <a:pPr marL="0" indent="0">
+              <a:buNone/>
+            </a:pPr>
+            <a:r>
+              <a:rPr lang="pt-BR" sz="1800" dirty="0">
+                <a:latin typeface="+mj-lt"/>
+              </a:rPr>
+              <a:t>  12 Anos - Leu a biografia completa de </a:t>
+            </a:r>
+            <a:r>
+              <a:rPr lang="pt-BR" sz="1800" dirty="0" err="1">
                 <a:latin typeface="+mj-lt"/>
               </a:rPr>
               <a:t>Nikola</a:t>
             </a:r>
             <a:r>
-              <a:rPr lang="pt-BR" sz="2400" dirty="0" smtClean="0">
+              <a:rPr lang="pt-BR" sz="1800" dirty="0">
                 <a:latin typeface="+mj-lt"/>
               </a:rPr>
               <a:t> Tesla</a:t>
             </a:r>
-            <a:endParaRPr lang="pt-BR" sz="2400" dirty="0">
-              <a:latin typeface="+mj-lt"/>
-            </a:endParaRPr>
+          </a:p>
+          <a:p>
+            <a:pPr marL="0" indent="0">
+              <a:buNone/>
+            </a:pPr>
+            <a:r>
+              <a:rPr lang="pt-BR" sz="1800" dirty="0">
+                <a:latin typeface="+mj-lt"/>
+              </a:rPr>
+              <a:t>                                            </a:t>
+            </a:r>
           </a:p>
         </p:txBody>
       </p:sp>
@@ -3279,7 +3767,7 @@
           </p:cNvPicPr>
           <p:nvPr/>
         </p:nvPicPr>
-        <p:blipFill>
+        <p:blipFill rotWithShape="1">
           <a:blip r:embed="rId2">
             <a:extLst>
               <a:ext uri="{28A0092B-C50C-407E-A947-70E740481C1C}">
@@ -3287,23 +3775,89 @@
               </a:ext>
             </a:extLst>
           </a:blip>
-          <a:srcRect/>
-          <a:stretch>
-            <a:fillRect/>
-          </a:stretch>
+          <a:srcRect l="2057" r="21309" b="2"/>
+          <a:stretch/>
         </p:blipFill>
         <p:spPr bwMode="auto">
           <a:xfrm>
-            <a:off x="7091631" y="216889"/>
-            <a:ext cx="4451497" cy="3709581"/>
+            <a:off x="6006345" y="10"/>
+            <a:ext cx="6058158" cy="6580988"/>
           </a:xfrm>
-          <a:prstGeom prst="rect">
+          <a:custGeom>
             <a:avLst/>
-          </a:prstGeom>
+            <a:gdLst>
+              <a:gd name="connsiteX0" fmla="*/ 65565 w 6313150"/>
+              <a:gd name="connsiteY0" fmla="*/ 0 h 6857997"/>
+              <a:gd name="connsiteX1" fmla="*/ 6313150 w 6313150"/>
+              <a:gd name="connsiteY1" fmla="*/ 0 h 6857997"/>
+              <a:gd name="connsiteX2" fmla="*/ 6313150 w 6313150"/>
+              <a:gd name="connsiteY2" fmla="*/ 6857997 h 6857997"/>
+              <a:gd name="connsiteX3" fmla="*/ 3293946 w 6313150"/>
+              <a:gd name="connsiteY3" fmla="*/ 6857997 h 6857997"/>
+              <a:gd name="connsiteX4" fmla="*/ 3235857 w 6313150"/>
+              <a:gd name="connsiteY4" fmla="*/ 6823061 h 6857997"/>
+              <a:gd name="connsiteX5" fmla="*/ 0 w 6313150"/>
+              <a:gd name="connsiteY5" fmla="*/ 951803 h 6857997"/>
+              <a:gd name="connsiteX6" fmla="*/ 31536 w 6313150"/>
+              <a:gd name="connsiteY6" fmla="*/ 285771 h 6857997"/>
+            </a:gdLst>
+            <a:ahLst/>
+            <a:cxnLst>
+              <a:cxn ang="0">
+                <a:pos x="connsiteX0" y="connsiteY0"/>
+              </a:cxn>
+              <a:cxn ang="0">
+                <a:pos x="connsiteX1" y="connsiteY1"/>
+              </a:cxn>
+              <a:cxn ang="0">
+                <a:pos x="connsiteX2" y="connsiteY2"/>
+              </a:cxn>
+              <a:cxn ang="0">
+                <a:pos x="connsiteX3" y="connsiteY3"/>
+              </a:cxn>
+              <a:cxn ang="0">
+                <a:pos x="connsiteX4" y="connsiteY4"/>
+              </a:cxn>
+              <a:cxn ang="0">
+                <a:pos x="connsiteX5" y="connsiteY5"/>
+              </a:cxn>
+              <a:cxn ang="0">
+                <a:pos x="connsiteX6" y="connsiteY6"/>
+              </a:cxn>
+            </a:cxnLst>
+            <a:rect l="l" t="t" r="r" b="b"/>
+            <a:pathLst>
+              <a:path w="6313150" h="6857997">
+                <a:moveTo>
+                  <a:pt x="65565" y="0"/>
+                </a:moveTo>
+                <a:lnTo>
+                  <a:pt x="6313150" y="0"/>
+                </a:lnTo>
+                <a:lnTo>
+                  <a:pt x="6313150" y="6857997"/>
+                </a:lnTo>
+                <a:lnTo>
+                  <a:pt x="3293946" y="6857997"/>
+                </a:lnTo>
+                <a:lnTo>
+                  <a:pt x="3235857" y="6823061"/>
+                </a:lnTo>
+                <a:cubicBezTo>
+                  <a:pt x="1291240" y="5592803"/>
+                  <a:pt x="0" y="3423096"/>
+                  <a:pt x="0" y="951803"/>
+                </a:cubicBezTo>
+                <a:cubicBezTo>
+                  <a:pt x="0" y="727140"/>
+                  <a:pt x="10673" y="504970"/>
+                  <a:pt x="31536" y="285771"/>
+                </a:cubicBezTo>
+                <a:close/>
+              </a:path>
+            </a:pathLst>
+          </a:custGeom>
           <a:noFill/>
-          <a:effectLst>
-            <a:softEdge rad="63500"/>
-          </a:effectLst>
           <a:extLst>
             <a:ext uri="{909E8E84-426E-40DD-AFC4-6F175D3DCCD1}">
               <a14:hiddenFill xmlns:a14="http://schemas.microsoft.com/office/drawing/2010/main">
@@ -3315,9 +3869,61 @@
           </a:extLst>
         </p:spPr>
       </p:pic>
+      <p:sp>
+        <p:nvSpPr>
+          <p:cNvPr id="5" name="Retângulo 4">
+            <a:extLst>
+              <a:ext uri="{FF2B5EF4-FFF2-40B4-BE49-F238E27FC236}">
+                <a16:creationId xmlns:a16="http://schemas.microsoft.com/office/drawing/2014/main" id="{92217894-1467-4D3A-8418-4FD8E08B7B36}"/>
+              </a:ext>
+            </a:extLst>
+          </p:cNvPr>
+          <p:cNvSpPr/>
+          <p:nvPr/>
+        </p:nvSpPr>
+        <p:spPr>
+          <a:xfrm>
+            <a:off x="5410200" y="6156281"/>
+            <a:ext cx="3109479" cy="369332"/>
+          </a:xfrm>
+          <a:prstGeom prst="rect">
+            <a:avLst/>
+          </a:prstGeom>
+          <a:solidFill>
+            <a:srgbClr val="FFFFFF"/>
+          </a:solidFill>
+        </p:spPr>
+        <p:txBody>
+          <a:bodyPr wrap="square">
+            <a:spAutoFit/>
+          </a:bodyPr>
+          <a:lstStyle/>
+          <a:p>
+            <a:pPr algn="ctr">
+              <a:spcAft>
+                <a:spcPts val="600"/>
+              </a:spcAft>
+            </a:pPr>
+            <a:r>
+              <a:rPr lang="pt-BR" dirty="0">
+                <a:solidFill>
+                  <a:srgbClr val="000000"/>
+                </a:solidFill>
+              </a:rPr>
+              <a:t> Michigan, EUA - 1973</a:t>
+            </a:r>
+          </a:p>
+        </p:txBody>
+      </p:sp>
       <p:pic>
         <p:nvPicPr>
-          <p:cNvPr id="4" name="Imagem 3"/>
+          <p:cNvPr id="6" name="Imagem 5">
+            <a:extLst>
+              <a:ext uri="{FF2B5EF4-FFF2-40B4-BE49-F238E27FC236}">
+                <a16:creationId xmlns:a16="http://schemas.microsoft.com/office/drawing/2014/main" id="{CBEE2163-7023-4D0C-913F-9A91EF374BF8}"/>
+              </a:ext>
+            </a:extLst>
+          </p:cNvPr>
           <p:cNvPicPr>
             <a:picLocks noChangeAspect="1"/>
           </p:cNvPicPr>
@@ -3331,8 +3937,1174 @@
         </p:blipFill>
         <p:spPr>
           <a:xfrm>
-            <a:off x="1702362" y="2531013"/>
-            <a:ext cx="3962400" cy="3962400"/>
+            <a:off x="127497" y="3966059"/>
+            <a:ext cx="2526816" cy="2526816"/>
+          </a:xfrm>
+          <a:prstGeom prst="rect">
+            <a:avLst/>
+          </a:prstGeom>
+        </p:spPr>
+      </p:pic>
+      <p:sp>
+        <p:nvSpPr>
+          <p:cNvPr id="7" name="CaixaDeTexto 6">
+            <a:extLst>
+              <a:ext uri="{FF2B5EF4-FFF2-40B4-BE49-F238E27FC236}">
+                <a16:creationId xmlns:a16="http://schemas.microsoft.com/office/drawing/2014/main" id="{40BF6CFD-C321-491F-81B0-75347543F50F}"/>
+              </a:ext>
+            </a:extLst>
+          </p:cNvPr>
+          <p:cNvSpPr txBox="1"/>
+          <p:nvPr/>
+        </p:nvSpPr>
+        <p:spPr>
+          <a:xfrm>
+            <a:off x="2654313" y="4299273"/>
+            <a:ext cx="10843352" cy="646331"/>
+          </a:xfrm>
+          <a:prstGeom prst="rect">
+            <a:avLst/>
+          </a:prstGeom>
+          <a:noFill/>
+        </p:spPr>
+        <p:txBody>
+          <a:bodyPr wrap="square" rtlCol="0">
+            <a:spAutoFit/>
+          </a:bodyPr>
+          <a:lstStyle/>
+          <a:p>
+            <a:r>
+              <a:rPr lang="pt-BR" dirty="0">
+                <a:latin typeface="+mj-lt"/>
+              </a:rPr>
+              <a:t> 22  Anos - Entrou para faculdade de Stanford </a:t>
+            </a:r>
+          </a:p>
+          <a:p>
+            <a:r>
+              <a:rPr lang="pt-BR" dirty="0">
+                <a:latin typeface="+mj-lt"/>
+              </a:rPr>
+              <a:t>onde conheceu seu amigo Sergey Brin</a:t>
+            </a:r>
+          </a:p>
+        </p:txBody>
+      </p:sp>
+      <p:sp>
+        <p:nvSpPr>
+          <p:cNvPr id="8" name="CaixaDeTexto 7">
+            <a:extLst>
+              <a:ext uri="{FF2B5EF4-FFF2-40B4-BE49-F238E27FC236}">
+                <a16:creationId xmlns:a16="http://schemas.microsoft.com/office/drawing/2014/main" id="{4B18721B-3109-40BA-9E28-5239AB5129CE}"/>
+              </a:ext>
+            </a:extLst>
+          </p:cNvPr>
+          <p:cNvSpPr txBox="1"/>
+          <p:nvPr/>
+        </p:nvSpPr>
+        <p:spPr>
+          <a:xfrm>
+            <a:off x="3643604" y="5462719"/>
+            <a:ext cx="2571666" cy="369332"/>
+          </a:xfrm>
+          <a:prstGeom prst="rect">
+            <a:avLst/>
+          </a:prstGeom>
+          <a:noFill/>
+        </p:spPr>
+        <p:txBody>
+          <a:bodyPr wrap="none" rtlCol="0">
+            <a:spAutoFit/>
+          </a:bodyPr>
+          <a:lstStyle/>
+          <a:p>
+            <a:r>
+              <a:rPr lang="pt-BR" dirty="0"/>
+              <a:t>23 Anos – Teve um sonho</a:t>
+            </a:r>
+          </a:p>
+        </p:txBody>
+      </p:sp>
+    </p:spTree>
+    <p:extLst>
+      <p:ext uri="{BB962C8B-B14F-4D97-AF65-F5344CB8AC3E}">
+        <p14:creationId xmlns:p14="http://schemas.microsoft.com/office/powerpoint/2010/main" val="2482289772"/>
+      </p:ext>
+    </p:extLst>
+  </p:cSld>
+  <p:clrMapOvr>
+    <a:masterClrMapping/>
+  </p:clrMapOvr>
+</p:sld>
+</file>
+
+<file path=ppt/slides/slide3.xml><?xml version="1.0" encoding="utf-8"?>
+<p:sld xmlns:a="http://schemas.openxmlformats.org/drawingml/2006/main" xmlns:r="http://schemas.openxmlformats.org/officeDocument/2006/relationships" xmlns:p="http://schemas.openxmlformats.org/presentationml/2006/main">
+  <p:cSld>
+    <p:bg>
+      <p:bgPr>
+        <a:solidFill>
+          <a:schemeClr val="bg1"/>
+        </a:solidFill>
+        <a:effectLst/>
+      </p:bgPr>
+    </p:bg>
+    <p:spTree>
+      <p:nvGrpSpPr>
+        <p:cNvPr id="1" name=""/>
+        <p:cNvGrpSpPr/>
+        <p:nvPr/>
+      </p:nvGrpSpPr>
+      <p:grpSpPr>
+        <a:xfrm>
+          <a:off x="0" y="0"/>
+          <a:ext cx="0" cy="0"/>
+          <a:chOff x="0" y="0"/>
+          <a:chExt cx="0" cy="0"/>
+        </a:xfrm>
+      </p:grpSpPr>
+      <p:pic>
+        <p:nvPicPr>
+          <p:cNvPr id="10" name="Imagem 9">
+            <a:extLst>
+              <a:ext uri="{FF2B5EF4-FFF2-40B4-BE49-F238E27FC236}">
+                <a16:creationId xmlns:a16="http://schemas.microsoft.com/office/drawing/2014/main" id="{DB469C28-D95D-422F-9893-5DB672730CB7}"/>
+              </a:ext>
+            </a:extLst>
+          </p:cNvPr>
+          <p:cNvPicPr>
+            <a:picLocks noChangeAspect="1"/>
+          </p:cNvPicPr>
+          <p:nvPr/>
+        </p:nvPicPr>
+        <p:blipFill>
+          <a:blip r:embed="rId2"/>
+          <a:stretch>
+            <a:fillRect/>
+          </a:stretch>
+        </p:blipFill>
+        <p:spPr>
+          <a:xfrm>
+            <a:off x="7047573" y="1074224"/>
+            <a:ext cx="3984861" cy="1942619"/>
+          </a:xfrm>
+          <a:prstGeom prst="roundRect">
+            <a:avLst>
+              <a:gd name="adj" fmla="val 8594"/>
+            </a:avLst>
+          </a:prstGeom>
+          <a:solidFill>
+            <a:srgbClr val="FFFFFF">
+              <a:shade val="85000"/>
+            </a:srgbClr>
+          </a:solidFill>
+          <a:ln>
+            <a:noFill/>
+          </a:ln>
+          <a:effectLst>
+            <a:reflection blurRad="12700" stA="38000" endPos="28000" dist="5000" dir="5400000" sy="-100000" algn="bl" rotWithShape="0"/>
+          </a:effectLst>
+        </p:spPr>
+      </p:pic>
+      <p:pic>
+        <p:nvPicPr>
+          <p:cNvPr id="14" name="Espaço Reservado para Conteúdo 13">
+            <a:extLst>
+              <a:ext uri="{FF2B5EF4-FFF2-40B4-BE49-F238E27FC236}">
+                <a16:creationId xmlns:a16="http://schemas.microsoft.com/office/drawing/2014/main" id="{DDA324B2-8039-46C5-AF93-31290FFAA265}"/>
+              </a:ext>
+            </a:extLst>
+          </p:cNvPr>
+          <p:cNvPicPr>
+            <a:picLocks noGrp="1" noChangeAspect="1"/>
+          </p:cNvPicPr>
+          <p:nvPr>
+            <p:ph idx="1"/>
+          </p:nvPr>
+        </p:nvPicPr>
+        <p:blipFill rotWithShape="1">
+          <a:blip r:embed="rId3"/>
+          <a:srcRect l="25717" t="23112" r="25475" b="36152"/>
+          <a:stretch/>
+        </p:blipFill>
+        <p:spPr>
+          <a:xfrm>
+            <a:off x="6096000" y="891089"/>
+            <a:ext cx="5885208" cy="2766927"/>
+          </a:xfrm>
+          <a:prstGeom prst="rect">
+            <a:avLst/>
+          </a:prstGeom>
+        </p:spPr>
+      </p:pic>
+      <p:sp>
+        <p:nvSpPr>
+          <p:cNvPr id="15" name="CaixaDeTexto 14">
+            <a:extLst>
+              <a:ext uri="{FF2B5EF4-FFF2-40B4-BE49-F238E27FC236}">
+                <a16:creationId xmlns:a16="http://schemas.microsoft.com/office/drawing/2014/main" id="{9C687AD1-4991-4AF7-BF67-84054794086F}"/>
+              </a:ext>
+            </a:extLst>
+          </p:cNvPr>
+          <p:cNvSpPr txBox="1"/>
+          <p:nvPr/>
+        </p:nvSpPr>
+        <p:spPr>
+          <a:xfrm>
+            <a:off x="556802" y="1074224"/>
+            <a:ext cx="4936435" cy="1200329"/>
+          </a:xfrm>
+          <a:prstGeom prst="rect">
+            <a:avLst/>
+          </a:prstGeom>
+          <a:noFill/>
+        </p:spPr>
+        <p:txBody>
+          <a:bodyPr wrap="square" rtlCol="0">
+            <a:spAutoFit/>
+          </a:bodyPr>
+          <a:lstStyle/>
+          <a:p>
+            <a:r>
+              <a:rPr lang="pt-BR" dirty="0"/>
+              <a:t>Em 1996 foi criado o </a:t>
+            </a:r>
+            <a:r>
+              <a:rPr lang="pt-BR" dirty="0" err="1"/>
+              <a:t>Backrub</a:t>
+            </a:r>
+            <a:endParaRPr lang="pt-BR" dirty="0"/>
+          </a:p>
+          <a:p>
+            <a:pPr marL="285750" indent="-285750">
+              <a:buFont typeface="Arial" panose="020B0604020202020204" pitchFamily="34" charset="0"/>
+              <a:buChar char="•"/>
+            </a:pPr>
+            <a:r>
+              <a:rPr lang="pt-BR" dirty="0"/>
+              <a:t>Mais inovador</a:t>
+            </a:r>
+          </a:p>
+          <a:p>
+            <a:pPr marL="285750" indent="-285750">
+              <a:buFont typeface="Arial" panose="020B0604020202020204" pitchFamily="34" charset="0"/>
+              <a:buChar char="•"/>
+            </a:pPr>
+            <a:r>
+              <a:rPr lang="pt-BR" dirty="0"/>
+              <a:t>Mais Complexo</a:t>
+            </a:r>
+          </a:p>
+          <a:p>
+            <a:pPr marL="285750" indent="-285750">
+              <a:buFont typeface="Arial" panose="020B0604020202020204" pitchFamily="34" charset="0"/>
+              <a:buChar char="•"/>
+            </a:pPr>
+            <a:r>
+              <a:rPr lang="pt-BR" dirty="0"/>
+              <a:t>Com um mecanismo de </a:t>
+            </a:r>
+            <a:r>
+              <a:rPr lang="pt-BR" dirty="0" err="1"/>
+              <a:t>backlinks</a:t>
+            </a:r>
+            <a:r>
+              <a:rPr lang="pt-BR" dirty="0"/>
+              <a:t> como votos</a:t>
+            </a:r>
+          </a:p>
+        </p:txBody>
+      </p:sp>
+      <p:sp>
+        <p:nvSpPr>
+          <p:cNvPr id="16" name="CaixaDeTexto 15">
+            <a:extLst>
+              <a:ext uri="{FF2B5EF4-FFF2-40B4-BE49-F238E27FC236}">
+                <a16:creationId xmlns:a16="http://schemas.microsoft.com/office/drawing/2014/main" id="{DCEEB050-1B1D-4069-A56F-2DC78A10D366}"/>
+              </a:ext>
+            </a:extLst>
+          </p:cNvPr>
+          <p:cNvSpPr txBox="1"/>
+          <p:nvPr/>
+        </p:nvSpPr>
+        <p:spPr>
+          <a:xfrm>
+            <a:off x="352104" y="2868284"/>
+            <a:ext cx="5345830" cy="923330"/>
+          </a:xfrm>
+          <a:prstGeom prst="rect">
+            <a:avLst/>
+          </a:prstGeom>
+          <a:noFill/>
+        </p:spPr>
+        <p:txBody>
+          <a:bodyPr wrap="square" rtlCol="0">
+            <a:spAutoFit/>
+          </a:bodyPr>
+          <a:lstStyle/>
+          <a:p>
+            <a:r>
+              <a:rPr lang="pt-BR" dirty="0"/>
+              <a:t>Em 1998 o Google chamou atenção do Vale do </a:t>
+            </a:r>
+            <a:r>
+              <a:rPr lang="pt-BR" dirty="0" err="1"/>
+              <a:t>Silicio</a:t>
+            </a:r>
+            <a:r>
+              <a:rPr lang="pt-BR" dirty="0"/>
+              <a:t> recebendo um cheque de U$ 100 mil </a:t>
+            </a:r>
+          </a:p>
+          <a:p>
+            <a:pPr algn="ctr"/>
+            <a:endParaRPr lang="pt-BR" dirty="0"/>
+          </a:p>
+        </p:txBody>
+      </p:sp>
+      <p:sp>
+        <p:nvSpPr>
+          <p:cNvPr id="18" name="Retângulo 17">
+            <a:extLst>
+              <a:ext uri="{FF2B5EF4-FFF2-40B4-BE49-F238E27FC236}">
+                <a16:creationId xmlns:a16="http://schemas.microsoft.com/office/drawing/2014/main" id="{F369A3BB-E8A9-496E-BF90-87C6F908F664}"/>
+              </a:ext>
+            </a:extLst>
+          </p:cNvPr>
+          <p:cNvSpPr/>
+          <p:nvPr/>
+        </p:nvSpPr>
+        <p:spPr>
+          <a:xfrm>
+            <a:off x="311753" y="3940173"/>
+            <a:ext cx="6096000" cy="923330"/>
+          </a:xfrm>
+          <a:prstGeom prst="rect">
+            <a:avLst/>
+          </a:prstGeom>
+        </p:spPr>
+        <p:txBody>
+          <a:bodyPr>
+            <a:spAutoFit/>
+          </a:bodyPr>
+          <a:lstStyle/>
+          <a:p>
+            <a:r>
+              <a:rPr lang="pt-BR" dirty="0">
+                <a:solidFill>
+                  <a:srgbClr val="181818"/>
+                </a:solidFill>
+                <a:latin typeface="Noto Serif JP"/>
+              </a:rPr>
+              <a:t> Atualmente o Google tem mais de 60 mil funcionários em 50 países e é dona de outros grandes como o Android e o Youtube. </a:t>
+            </a:r>
+            <a:endParaRPr lang="pt-BR" dirty="0"/>
+          </a:p>
+        </p:txBody>
+      </p:sp>
+      <p:pic>
+        <p:nvPicPr>
+          <p:cNvPr id="20" name="Imagem 19">
+            <a:extLst>
+              <a:ext uri="{FF2B5EF4-FFF2-40B4-BE49-F238E27FC236}">
+                <a16:creationId xmlns:a16="http://schemas.microsoft.com/office/drawing/2014/main" id="{FB65E1DB-DF90-41E4-98C4-9BC5DC806037}"/>
+              </a:ext>
+            </a:extLst>
+          </p:cNvPr>
+          <p:cNvPicPr>
+            <a:picLocks noChangeAspect="1"/>
+          </p:cNvPicPr>
+          <p:nvPr/>
+        </p:nvPicPr>
+        <p:blipFill rotWithShape="1">
+          <a:blip r:embed="rId4"/>
+          <a:srcRect l="35391" t="19434" r="38607" b="22774"/>
+          <a:stretch/>
+        </p:blipFill>
+        <p:spPr>
+          <a:xfrm>
+            <a:off x="828071" y="4946374"/>
+            <a:ext cx="1360924" cy="1580441"/>
+          </a:xfrm>
+          <a:prstGeom prst="rect">
+            <a:avLst/>
+          </a:prstGeom>
+        </p:spPr>
+      </p:pic>
+      <p:pic>
+        <p:nvPicPr>
+          <p:cNvPr id="21" name="Imagem 20">
+            <a:extLst>
+              <a:ext uri="{FF2B5EF4-FFF2-40B4-BE49-F238E27FC236}">
+                <a16:creationId xmlns:a16="http://schemas.microsoft.com/office/drawing/2014/main" id="{BE57103B-2BD6-4390-90E6-4E440ECF894A}"/>
+              </a:ext>
+            </a:extLst>
+          </p:cNvPr>
+          <p:cNvPicPr>
+            <a:picLocks noChangeAspect="1"/>
+          </p:cNvPicPr>
+          <p:nvPr/>
+        </p:nvPicPr>
+        <p:blipFill>
+          <a:blip r:embed="rId5">
+            <a:extLst>
+              <a:ext uri="{BEBA8EAE-BF5A-486C-A8C5-ECC9F3942E4B}">
+                <a14:imgProps xmlns:a14="http://schemas.microsoft.com/office/drawing/2010/main">
+                  <a14:imgLayer r:embed="rId6">
+                    <a14:imgEffect>
+                      <a14:backgroundRemoval t="10000" b="90000" l="10000" r="90000"/>
+                    </a14:imgEffect>
+                  </a14:imgLayer>
+                </a14:imgProps>
+              </a:ext>
+            </a:extLst>
+          </a:blip>
+          <a:stretch>
+            <a:fillRect/>
+          </a:stretch>
+        </p:blipFill>
+        <p:spPr>
+          <a:xfrm>
+            <a:off x="2911818" y="4566384"/>
+            <a:ext cx="2374196" cy="2291616"/>
+          </a:xfrm>
+          <a:prstGeom prst="rect">
+            <a:avLst/>
+          </a:prstGeom>
+        </p:spPr>
+      </p:pic>
+      <p:pic>
+        <p:nvPicPr>
+          <p:cNvPr id="22" name="Imagem 21">
+            <a:extLst>
+              <a:ext uri="{FF2B5EF4-FFF2-40B4-BE49-F238E27FC236}">
+                <a16:creationId xmlns:a16="http://schemas.microsoft.com/office/drawing/2014/main" id="{560C07A0-C820-44B5-91E9-8CEB80D6FF3A}"/>
+              </a:ext>
+            </a:extLst>
+          </p:cNvPr>
+          <p:cNvPicPr>
+            <a:picLocks noChangeAspect="1"/>
+          </p:cNvPicPr>
+          <p:nvPr/>
+        </p:nvPicPr>
+        <p:blipFill>
+          <a:blip r:embed="rId7"/>
+          <a:stretch>
+            <a:fillRect/>
+          </a:stretch>
+        </p:blipFill>
+        <p:spPr>
+          <a:xfrm>
+            <a:off x="6853080" y="3706638"/>
+            <a:ext cx="4371047" cy="2867358"/>
+          </a:xfrm>
+          <a:prstGeom prst="rect">
+            <a:avLst/>
+          </a:prstGeom>
+          <a:ln>
+            <a:noFill/>
+          </a:ln>
+          <a:effectLst>
+            <a:softEdge rad="112500"/>
+          </a:effectLst>
+        </p:spPr>
+      </p:pic>
+      <p:pic>
+        <p:nvPicPr>
+          <p:cNvPr id="23" name="Imagem 22">
+            <a:extLst>
+              <a:ext uri="{FF2B5EF4-FFF2-40B4-BE49-F238E27FC236}">
+                <a16:creationId xmlns:a16="http://schemas.microsoft.com/office/drawing/2014/main" id="{0896855E-CD49-4BFA-94F7-05AB0962718A}"/>
+              </a:ext>
+            </a:extLst>
+          </p:cNvPr>
+          <p:cNvPicPr>
+            <a:picLocks noChangeAspect="1"/>
+          </p:cNvPicPr>
+          <p:nvPr/>
+        </p:nvPicPr>
+        <p:blipFill>
+          <a:blip r:embed="rId8"/>
+          <a:stretch>
+            <a:fillRect/>
+          </a:stretch>
+        </p:blipFill>
+        <p:spPr>
+          <a:xfrm>
+            <a:off x="6503809" y="3832594"/>
+            <a:ext cx="4860120" cy="2730770"/>
+          </a:xfrm>
+          <a:prstGeom prst="rect">
+            <a:avLst/>
+          </a:prstGeom>
+          <a:ln>
+            <a:noFill/>
+          </a:ln>
+          <a:effectLst>
+            <a:softEdge rad="112500"/>
+          </a:effectLst>
+        </p:spPr>
+      </p:pic>
+    </p:spTree>
+    <p:extLst>
+      <p:ext uri="{BB962C8B-B14F-4D97-AF65-F5344CB8AC3E}">
+        <p14:creationId xmlns:p14="http://schemas.microsoft.com/office/powerpoint/2010/main" val="2806262925"/>
+      </p:ext>
+    </p:extLst>
+  </p:cSld>
+  <p:clrMapOvr>
+    <a:masterClrMapping/>
+  </p:clrMapOvr>
+  <p:timing>
+    <p:tnLst>
+      <p:par>
+        <p:cTn id="1" dur="indefinite" restart="never" nodeType="tmRoot">
+          <p:childTnLst>
+            <p:seq concurrent="1" nextAc="seek">
+              <p:cTn id="2" dur="indefinite" nodeType="mainSeq">
+                <p:childTnLst>
+                  <p:par>
+                    <p:cTn id="3" fill="hold">
+                      <p:stCondLst>
+                        <p:cond delay="indefinite"/>
+                      </p:stCondLst>
+                      <p:childTnLst>
+                        <p:par>
+                          <p:cTn id="4" fill="hold">
+                            <p:stCondLst>
+                              <p:cond delay="0"/>
+                            </p:stCondLst>
+                            <p:childTnLst>
+                              <p:par>
+                                <p:cTn id="5" presetID="22" presetClass="exit" presetSubtype="4" fill="hold" nodeType="clickEffect">
+                                  <p:stCondLst>
+                                    <p:cond delay="0"/>
+                                  </p:stCondLst>
+                                  <p:childTnLst>
+                                    <p:animEffect transition="out" filter="wipe(down)">
+                                      <p:cBhvr>
+                                        <p:cTn id="6" dur="500"/>
+                                        <p:tgtEl>
+                                          <p:spTgt spid="10"/>
+                                        </p:tgtEl>
+                                      </p:cBhvr>
+                                    </p:animEffect>
+                                    <p:set>
+                                      <p:cBhvr>
+                                        <p:cTn id="7" dur="1" fill="hold">
+                                          <p:stCondLst>
+                                            <p:cond delay="499"/>
+                                          </p:stCondLst>
+                                        </p:cTn>
+                                        <p:tgtEl>
+                                          <p:spTgt spid="10"/>
+                                        </p:tgtEl>
+                                        <p:attrNameLst>
+                                          <p:attrName>style.visibility</p:attrName>
+                                        </p:attrNameLst>
+                                      </p:cBhvr>
+                                      <p:to>
+                                        <p:strVal val="hidden"/>
+                                      </p:to>
+                                    </p:set>
+                                  </p:childTnLst>
+                                </p:cTn>
+                              </p:par>
+                              <p:par>
+                                <p:cTn id="8" presetID="22" presetClass="entr" presetSubtype="4" fill="hold" nodeType="withEffect">
+                                  <p:stCondLst>
+                                    <p:cond delay="0"/>
+                                  </p:stCondLst>
+                                  <p:childTnLst>
+                                    <p:set>
+                                      <p:cBhvr>
+                                        <p:cTn id="9" dur="1" fill="hold">
+                                          <p:stCondLst>
+                                            <p:cond delay="0"/>
+                                          </p:stCondLst>
+                                        </p:cTn>
+                                        <p:tgtEl>
+                                          <p:spTgt spid="14"/>
+                                        </p:tgtEl>
+                                        <p:attrNameLst>
+                                          <p:attrName>style.visibility</p:attrName>
+                                        </p:attrNameLst>
+                                      </p:cBhvr>
+                                      <p:to>
+                                        <p:strVal val="visible"/>
+                                      </p:to>
+                                    </p:set>
+                                    <p:animEffect transition="in" filter="wipe(down)">
+                                      <p:cBhvr>
+                                        <p:cTn id="10" dur="500"/>
+                                        <p:tgtEl>
+                                          <p:spTgt spid="14"/>
+                                        </p:tgtEl>
+                                      </p:cBhvr>
+                                    </p:animEffect>
+                                  </p:childTnLst>
+                                </p:cTn>
+                              </p:par>
+                            </p:childTnLst>
+                          </p:cTn>
+                        </p:par>
+                      </p:childTnLst>
+                    </p:cTn>
+                  </p:par>
+                  <p:par>
+                    <p:cTn id="11" fill="hold">
+                      <p:stCondLst>
+                        <p:cond delay="indefinite"/>
+                      </p:stCondLst>
+                      <p:childTnLst>
+                        <p:par>
+                          <p:cTn id="12" fill="hold">
+                            <p:stCondLst>
+                              <p:cond delay="0"/>
+                            </p:stCondLst>
+                            <p:childTnLst>
+                              <p:par>
+                                <p:cTn id="13" presetID="10" presetClass="entr" presetSubtype="0" fill="hold" grpId="0" nodeType="clickEffect">
+                                  <p:stCondLst>
+                                    <p:cond delay="0"/>
+                                  </p:stCondLst>
+                                  <p:childTnLst>
+                                    <p:set>
+                                      <p:cBhvr>
+                                        <p:cTn id="14" dur="1" fill="hold">
+                                          <p:stCondLst>
+                                            <p:cond delay="0"/>
+                                          </p:stCondLst>
+                                        </p:cTn>
+                                        <p:tgtEl>
+                                          <p:spTgt spid="16"/>
+                                        </p:tgtEl>
+                                        <p:attrNameLst>
+                                          <p:attrName>style.visibility</p:attrName>
+                                        </p:attrNameLst>
+                                      </p:cBhvr>
+                                      <p:to>
+                                        <p:strVal val="visible"/>
+                                      </p:to>
+                                    </p:set>
+                                    <p:animEffect transition="in" filter="fade">
+                                      <p:cBhvr>
+                                        <p:cTn id="15" dur="500"/>
+                                        <p:tgtEl>
+                                          <p:spTgt spid="16"/>
+                                        </p:tgtEl>
+                                      </p:cBhvr>
+                                    </p:animEffect>
+                                  </p:childTnLst>
+                                </p:cTn>
+                              </p:par>
+                              <p:par>
+                                <p:cTn id="16" presetID="42" presetClass="entr" presetSubtype="0" fill="hold" nodeType="withEffect">
+                                  <p:stCondLst>
+                                    <p:cond delay="0"/>
+                                  </p:stCondLst>
+                                  <p:childTnLst>
+                                    <p:set>
+                                      <p:cBhvr>
+                                        <p:cTn id="17" dur="1" fill="hold">
+                                          <p:stCondLst>
+                                            <p:cond delay="0"/>
+                                          </p:stCondLst>
+                                        </p:cTn>
+                                        <p:tgtEl>
+                                          <p:spTgt spid="22"/>
+                                        </p:tgtEl>
+                                        <p:attrNameLst>
+                                          <p:attrName>style.visibility</p:attrName>
+                                        </p:attrNameLst>
+                                      </p:cBhvr>
+                                      <p:to>
+                                        <p:strVal val="visible"/>
+                                      </p:to>
+                                    </p:set>
+                                    <p:animEffect transition="in" filter="fade">
+                                      <p:cBhvr>
+                                        <p:cTn id="18" dur="1000"/>
+                                        <p:tgtEl>
+                                          <p:spTgt spid="22"/>
+                                        </p:tgtEl>
+                                      </p:cBhvr>
+                                    </p:animEffect>
+                                    <p:anim calcmode="lin" valueType="num">
+                                      <p:cBhvr>
+                                        <p:cTn id="19" dur="1000" fill="hold"/>
+                                        <p:tgtEl>
+                                          <p:spTgt spid="22"/>
+                                        </p:tgtEl>
+                                        <p:attrNameLst>
+                                          <p:attrName>ppt_x</p:attrName>
+                                        </p:attrNameLst>
+                                      </p:cBhvr>
+                                      <p:tavLst>
+                                        <p:tav tm="0">
+                                          <p:val>
+                                            <p:strVal val="#ppt_x"/>
+                                          </p:val>
+                                        </p:tav>
+                                        <p:tav tm="100000">
+                                          <p:val>
+                                            <p:strVal val="#ppt_x"/>
+                                          </p:val>
+                                        </p:tav>
+                                      </p:tavLst>
+                                    </p:anim>
+                                    <p:anim calcmode="lin" valueType="num">
+                                      <p:cBhvr>
+                                        <p:cTn id="20" dur="1000" fill="hold"/>
+                                        <p:tgtEl>
+                                          <p:spTgt spid="22"/>
+                                        </p:tgtEl>
+                                        <p:attrNameLst>
+                                          <p:attrName>ppt_y</p:attrName>
+                                        </p:attrNameLst>
+                                      </p:cBhvr>
+                                      <p:tavLst>
+                                        <p:tav tm="0">
+                                          <p:val>
+                                            <p:strVal val="#ppt_y+.1"/>
+                                          </p:val>
+                                        </p:tav>
+                                        <p:tav tm="100000">
+                                          <p:val>
+                                            <p:strVal val="#ppt_y"/>
+                                          </p:val>
+                                        </p:tav>
+                                      </p:tavLst>
+                                    </p:anim>
+                                  </p:childTnLst>
+                                </p:cTn>
+                              </p:par>
+                            </p:childTnLst>
+                          </p:cTn>
+                        </p:par>
+                      </p:childTnLst>
+                    </p:cTn>
+                  </p:par>
+                  <p:par>
+                    <p:cTn id="21" fill="hold">
+                      <p:stCondLst>
+                        <p:cond delay="indefinite"/>
+                      </p:stCondLst>
+                      <p:childTnLst>
+                        <p:par>
+                          <p:cTn id="22" fill="hold">
+                            <p:stCondLst>
+                              <p:cond delay="0"/>
+                            </p:stCondLst>
+                            <p:childTnLst>
+                              <p:par>
+                                <p:cTn id="23" presetID="10" presetClass="exit" presetSubtype="0" fill="hold" nodeType="clickEffect">
+                                  <p:stCondLst>
+                                    <p:cond delay="0"/>
+                                  </p:stCondLst>
+                                  <p:childTnLst>
+                                    <p:animEffect transition="out" filter="fade">
+                                      <p:cBhvr>
+                                        <p:cTn id="24" dur="500"/>
+                                        <p:tgtEl>
+                                          <p:spTgt spid="22"/>
+                                        </p:tgtEl>
+                                      </p:cBhvr>
+                                    </p:animEffect>
+                                    <p:set>
+                                      <p:cBhvr>
+                                        <p:cTn id="25" dur="1" fill="hold">
+                                          <p:stCondLst>
+                                            <p:cond delay="499"/>
+                                          </p:stCondLst>
+                                        </p:cTn>
+                                        <p:tgtEl>
+                                          <p:spTgt spid="22"/>
+                                        </p:tgtEl>
+                                        <p:attrNameLst>
+                                          <p:attrName>style.visibility</p:attrName>
+                                        </p:attrNameLst>
+                                      </p:cBhvr>
+                                      <p:to>
+                                        <p:strVal val="hidden"/>
+                                      </p:to>
+                                    </p:set>
+                                  </p:childTnLst>
+                                </p:cTn>
+                              </p:par>
+                              <p:par>
+                                <p:cTn id="26" presetID="10" presetClass="entr" presetSubtype="0" fill="hold" nodeType="withEffect">
+                                  <p:stCondLst>
+                                    <p:cond delay="0"/>
+                                  </p:stCondLst>
+                                  <p:childTnLst>
+                                    <p:set>
+                                      <p:cBhvr>
+                                        <p:cTn id="27" dur="1" fill="hold">
+                                          <p:stCondLst>
+                                            <p:cond delay="0"/>
+                                          </p:stCondLst>
+                                        </p:cTn>
+                                        <p:tgtEl>
+                                          <p:spTgt spid="23"/>
+                                        </p:tgtEl>
+                                        <p:attrNameLst>
+                                          <p:attrName>style.visibility</p:attrName>
+                                        </p:attrNameLst>
+                                      </p:cBhvr>
+                                      <p:to>
+                                        <p:strVal val="visible"/>
+                                      </p:to>
+                                    </p:set>
+                                    <p:animEffect transition="in" filter="fade">
+                                      <p:cBhvr>
+                                        <p:cTn id="28" dur="500"/>
+                                        <p:tgtEl>
+                                          <p:spTgt spid="23"/>
+                                        </p:tgtEl>
+                                      </p:cBhvr>
+                                    </p:animEffect>
+                                  </p:childTnLst>
+                                </p:cTn>
+                              </p:par>
+                            </p:childTnLst>
+                          </p:cTn>
+                        </p:par>
+                      </p:childTnLst>
+                    </p:cTn>
+                  </p:par>
+                  <p:par>
+                    <p:cTn id="29" fill="hold">
+                      <p:stCondLst>
+                        <p:cond delay="indefinite"/>
+                      </p:stCondLst>
+                      <p:childTnLst>
+                        <p:par>
+                          <p:cTn id="30" fill="hold">
+                            <p:stCondLst>
+                              <p:cond delay="0"/>
+                            </p:stCondLst>
+                            <p:childTnLst>
+                              <p:par>
+                                <p:cTn id="31" presetID="10" presetClass="entr" presetSubtype="0" fill="hold" grpId="0" nodeType="clickEffect">
+                                  <p:stCondLst>
+                                    <p:cond delay="0"/>
+                                  </p:stCondLst>
+                                  <p:childTnLst>
+                                    <p:set>
+                                      <p:cBhvr>
+                                        <p:cTn id="32" dur="1" fill="hold">
+                                          <p:stCondLst>
+                                            <p:cond delay="0"/>
+                                          </p:stCondLst>
+                                        </p:cTn>
+                                        <p:tgtEl>
+                                          <p:spTgt spid="18"/>
+                                        </p:tgtEl>
+                                        <p:attrNameLst>
+                                          <p:attrName>style.visibility</p:attrName>
+                                        </p:attrNameLst>
+                                      </p:cBhvr>
+                                      <p:to>
+                                        <p:strVal val="visible"/>
+                                      </p:to>
+                                    </p:set>
+                                    <p:animEffect transition="in" filter="fade">
+                                      <p:cBhvr>
+                                        <p:cTn id="33" dur="500"/>
+                                        <p:tgtEl>
+                                          <p:spTgt spid="18"/>
+                                        </p:tgtEl>
+                                      </p:cBhvr>
+                                    </p:animEffect>
+                                  </p:childTnLst>
+                                </p:cTn>
+                              </p:par>
+                            </p:childTnLst>
+                          </p:cTn>
+                        </p:par>
+                        <p:par>
+                          <p:cTn id="34" fill="hold">
+                            <p:stCondLst>
+                              <p:cond delay="500"/>
+                            </p:stCondLst>
+                            <p:childTnLst>
+                              <p:par>
+                                <p:cTn id="35" presetID="42" presetClass="entr" presetSubtype="0" fill="hold" nodeType="afterEffect">
+                                  <p:stCondLst>
+                                    <p:cond delay="0"/>
+                                  </p:stCondLst>
+                                  <p:childTnLst>
+                                    <p:set>
+                                      <p:cBhvr>
+                                        <p:cTn id="36" dur="1" fill="hold">
+                                          <p:stCondLst>
+                                            <p:cond delay="0"/>
+                                          </p:stCondLst>
+                                        </p:cTn>
+                                        <p:tgtEl>
+                                          <p:spTgt spid="20"/>
+                                        </p:tgtEl>
+                                        <p:attrNameLst>
+                                          <p:attrName>style.visibility</p:attrName>
+                                        </p:attrNameLst>
+                                      </p:cBhvr>
+                                      <p:to>
+                                        <p:strVal val="visible"/>
+                                      </p:to>
+                                    </p:set>
+                                    <p:animEffect transition="in" filter="fade">
+                                      <p:cBhvr>
+                                        <p:cTn id="37" dur="1000"/>
+                                        <p:tgtEl>
+                                          <p:spTgt spid="20"/>
+                                        </p:tgtEl>
+                                      </p:cBhvr>
+                                    </p:animEffect>
+                                    <p:anim calcmode="lin" valueType="num">
+                                      <p:cBhvr>
+                                        <p:cTn id="38" dur="1000" fill="hold"/>
+                                        <p:tgtEl>
+                                          <p:spTgt spid="20"/>
+                                        </p:tgtEl>
+                                        <p:attrNameLst>
+                                          <p:attrName>ppt_x</p:attrName>
+                                        </p:attrNameLst>
+                                      </p:cBhvr>
+                                      <p:tavLst>
+                                        <p:tav tm="0">
+                                          <p:val>
+                                            <p:strVal val="#ppt_x"/>
+                                          </p:val>
+                                        </p:tav>
+                                        <p:tav tm="100000">
+                                          <p:val>
+                                            <p:strVal val="#ppt_x"/>
+                                          </p:val>
+                                        </p:tav>
+                                      </p:tavLst>
+                                    </p:anim>
+                                    <p:anim calcmode="lin" valueType="num">
+                                      <p:cBhvr>
+                                        <p:cTn id="39" dur="1000" fill="hold"/>
+                                        <p:tgtEl>
+                                          <p:spTgt spid="20"/>
+                                        </p:tgtEl>
+                                        <p:attrNameLst>
+                                          <p:attrName>ppt_y</p:attrName>
+                                        </p:attrNameLst>
+                                      </p:cBhvr>
+                                      <p:tavLst>
+                                        <p:tav tm="0">
+                                          <p:val>
+                                            <p:strVal val="#ppt_y+.1"/>
+                                          </p:val>
+                                        </p:tav>
+                                        <p:tav tm="100000">
+                                          <p:val>
+                                            <p:strVal val="#ppt_y"/>
+                                          </p:val>
+                                        </p:tav>
+                                      </p:tavLst>
+                                    </p:anim>
+                                  </p:childTnLst>
+                                </p:cTn>
+                              </p:par>
+                              <p:par>
+                                <p:cTn id="40" presetID="42" presetClass="entr" presetSubtype="0" fill="hold" nodeType="withEffect">
+                                  <p:stCondLst>
+                                    <p:cond delay="0"/>
+                                  </p:stCondLst>
+                                  <p:childTnLst>
+                                    <p:set>
+                                      <p:cBhvr>
+                                        <p:cTn id="41" dur="1" fill="hold">
+                                          <p:stCondLst>
+                                            <p:cond delay="0"/>
+                                          </p:stCondLst>
+                                        </p:cTn>
+                                        <p:tgtEl>
+                                          <p:spTgt spid="21"/>
+                                        </p:tgtEl>
+                                        <p:attrNameLst>
+                                          <p:attrName>style.visibility</p:attrName>
+                                        </p:attrNameLst>
+                                      </p:cBhvr>
+                                      <p:to>
+                                        <p:strVal val="visible"/>
+                                      </p:to>
+                                    </p:set>
+                                    <p:animEffect transition="in" filter="fade">
+                                      <p:cBhvr>
+                                        <p:cTn id="42" dur="1000"/>
+                                        <p:tgtEl>
+                                          <p:spTgt spid="21"/>
+                                        </p:tgtEl>
+                                      </p:cBhvr>
+                                    </p:animEffect>
+                                    <p:anim calcmode="lin" valueType="num">
+                                      <p:cBhvr>
+                                        <p:cTn id="43" dur="1000" fill="hold"/>
+                                        <p:tgtEl>
+                                          <p:spTgt spid="21"/>
+                                        </p:tgtEl>
+                                        <p:attrNameLst>
+                                          <p:attrName>ppt_x</p:attrName>
+                                        </p:attrNameLst>
+                                      </p:cBhvr>
+                                      <p:tavLst>
+                                        <p:tav tm="0">
+                                          <p:val>
+                                            <p:strVal val="#ppt_x"/>
+                                          </p:val>
+                                        </p:tav>
+                                        <p:tav tm="100000">
+                                          <p:val>
+                                            <p:strVal val="#ppt_x"/>
+                                          </p:val>
+                                        </p:tav>
+                                      </p:tavLst>
+                                    </p:anim>
+                                    <p:anim calcmode="lin" valueType="num">
+                                      <p:cBhvr>
+                                        <p:cTn id="44" dur="1000" fill="hold"/>
+                                        <p:tgtEl>
+                                          <p:spTgt spid="21"/>
+                                        </p:tgtEl>
+                                        <p:attrNameLst>
+                                          <p:attrName>ppt_y</p:attrName>
+                                        </p:attrNameLst>
+                                      </p:cBhvr>
+                                      <p:tavLst>
+                                        <p:tav tm="0">
+                                          <p:val>
+                                            <p:strVal val="#ppt_y+.1"/>
+                                          </p:val>
+                                        </p:tav>
+                                        <p:tav tm="100000">
+                                          <p:val>
+                                            <p:strVal val="#ppt_y"/>
+                                          </p:val>
+                                        </p:tav>
+                                      </p:tavLst>
+                                    </p:anim>
+                                  </p:childTnLst>
+                                </p:cTn>
+                              </p:par>
+                            </p:childTnLst>
+                          </p:cTn>
+                        </p:par>
+                      </p:childTnLst>
+                    </p:cTn>
+                  </p:par>
+                </p:childTnLst>
+              </p:cTn>
+              <p:prevCondLst>
+                <p:cond evt="onPrev" delay="0">
+                  <p:tgtEl>
+                    <p:sldTgt/>
+                  </p:tgtEl>
+                </p:cond>
+              </p:prevCondLst>
+              <p:nextCondLst>
+                <p:cond evt="onNext" delay="0">
+                  <p:tgtEl>
+                    <p:sldTgt/>
+                  </p:tgtEl>
+                </p:cond>
+              </p:nextCondLst>
+            </p:seq>
+          </p:childTnLst>
+        </p:cTn>
+      </p:par>
+    </p:tnLst>
+    <p:bldLst>
+      <p:bldP spid="16" grpId="0"/>
+      <p:bldP spid="18" grpId="0"/>
+    </p:bldLst>
+  </p:timing>
+</p:sld>
+</file>
+
+<file path=ppt/slides/slide4.xml><?xml version="1.0" encoding="utf-8"?>
+<p:sld xmlns:a="http://schemas.openxmlformats.org/drawingml/2006/main" xmlns:r="http://schemas.openxmlformats.org/officeDocument/2006/relationships" xmlns:p="http://schemas.openxmlformats.org/presentationml/2006/main">
+  <p:cSld>
+    <p:spTree>
+      <p:nvGrpSpPr>
+        <p:cNvPr id="1" name=""/>
+        <p:cNvGrpSpPr/>
+        <p:nvPr/>
+      </p:nvGrpSpPr>
+      <p:grpSpPr>
+        <a:xfrm>
+          <a:off x="0" y="0"/>
+          <a:ext cx="0" cy="0"/>
+          <a:chOff x="0" y="0"/>
+          <a:chExt cx="0" cy="0"/>
+        </a:xfrm>
+      </p:grpSpPr>
+      <p:sp>
+        <p:nvSpPr>
+          <p:cNvPr id="2" name="Título 1">
+            <a:extLst>
+              <a:ext uri="{FF2B5EF4-FFF2-40B4-BE49-F238E27FC236}">
+                <a16:creationId xmlns:a16="http://schemas.microsoft.com/office/drawing/2014/main" id="{D5C535E4-5F2A-4CA6-B6F8-6D56DFA0CD0A}"/>
+              </a:ext>
+            </a:extLst>
+          </p:cNvPr>
+          <p:cNvSpPr>
+            <a:spLocks noGrp="1"/>
+          </p:cNvSpPr>
+          <p:nvPr>
+            <p:ph type="title"/>
+          </p:nvPr>
+        </p:nvSpPr>
+        <p:spPr>
+          <a:xfrm>
+            <a:off x="281609" y="304800"/>
+            <a:ext cx="8173278" cy="1520825"/>
+          </a:xfrm>
+        </p:spPr>
+        <p:txBody>
+          <a:bodyPr>
+            <a:noAutofit/>
+          </a:bodyPr>
+          <a:lstStyle/>
+          <a:p>
+            <a:pPr algn="ctr"/>
+            <a:r>
+              <a:rPr lang="pt-BR" sz="2400" dirty="0"/>
+              <a:t>“O trabalho não está terminado. Hoje a computação é uma bagunça, seu computador não sabe onde você está, o que você está fazendo e o que você já sabe”</a:t>
+            </a:r>
+          </a:p>
+        </p:txBody>
+      </p:sp>
+      <p:pic>
+        <p:nvPicPr>
+          <p:cNvPr id="4" name="Espaço Reservado para Conteúdo 3">
+            <a:extLst>
+              <a:ext uri="{FF2B5EF4-FFF2-40B4-BE49-F238E27FC236}">
+                <a16:creationId xmlns:a16="http://schemas.microsoft.com/office/drawing/2014/main" id="{C334A07C-7794-4A66-88BB-5BCFA65348BB}"/>
+              </a:ext>
+            </a:extLst>
+          </p:cNvPr>
+          <p:cNvPicPr>
+            <a:picLocks noGrp="1" noChangeAspect="1"/>
+          </p:cNvPicPr>
+          <p:nvPr>
+            <p:ph idx="1"/>
+          </p:nvPr>
+        </p:nvPicPr>
+        <p:blipFill>
+          <a:blip r:embed="rId2"/>
+          <a:stretch>
+            <a:fillRect/>
+          </a:stretch>
+        </p:blipFill>
+        <p:spPr>
+          <a:xfrm>
+            <a:off x="5031079" y="1825625"/>
+            <a:ext cx="6527007" cy="4351338"/>
           </a:xfrm>
           <a:prstGeom prst="rect">
             <a:avLst/>
@@ -3342,7 +5114,7 @@
     </p:spTree>
     <p:extLst>
       <p:ext uri="{BB962C8B-B14F-4D97-AF65-F5344CB8AC3E}">
-        <p14:creationId xmlns:p14="http://schemas.microsoft.com/office/powerpoint/2010/main" val="2482289772"/>
+        <p14:creationId xmlns:p14="http://schemas.microsoft.com/office/powerpoint/2010/main" val="3607105804"/>
       </p:ext>
     </p:extLst>
   </p:cSld>
@@ -3611,4 +5383,299 @@
     </a:ext>
   </a:extLst>
 </a:theme>
+</file>
+
+<file path=ppt/theme/theme2.xml><?xml version="1.0" encoding="utf-8"?>
+<a:theme xmlns:a="http://schemas.openxmlformats.org/drawingml/2006/main" name="Tema do Office">
+  <a:themeElements>
+    <a:clrScheme name="Office">
+      <a:dk1>
+        <a:sysClr val="windowText" lastClr="000000"/>
+      </a:dk1>
+      <a:lt1>
+        <a:sysClr val="window" lastClr="FFFFFF"/>
+      </a:lt1>
+      <a:dk2>
+        <a:srgbClr val="44546A"/>
+      </a:dk2>
+      <a:lt2>
+        <a:srgbClr val="E7E6E6"/>
+      </a:lt2>
+      <a:accent1>
+        <a:srgbClr val="4472C4"/>
+      </a:accent1>
+      <a:accent2>
+        <a:srgbClr val="ED7D31"/>
+      </a:accent2>
+      <a:accent3>
+        <a:srgbClr val="A5A5A5"/>
+      </a:accent3>
+      <a:accent4>
+        <a:srgbClr val="FFC000"/>
+      </a:accent4>
+      <a:accent5>
+        <a:srgbClr val="5B9BD5"/>
+      </a:accent5>
+      <a:accent6>
+        <a:srgbClr val="70AD47"/>
+      </a:accent6>
+      <a:hlink>
+        <a:srgbClr val="0563C1"/>
+      </a:hlink>
+      <a:folHlink>
+        <a:srgbClr val="954F72"/>
+      </a:folHlink>
+    </a:clrScheme>
+    <a:fontScheme name="Office">
+      <a:majorFont>
+        <a:latin typeface="Calibri Light" panose="020F0302020204030204"/>
+        <a:ea typeface=""/>
+        <a:cs typeface=""/>
+        <a:font script="Jpan" typeface="游ゴシック Light"/>
+        <a:font script="Hang" typeface="맑은 고딕"/>
+        <a:font script="Hans" typeface="等线 Light"/>
+        <a:font script="Hant" typeface="新細明體"/>
+        <a:font script="Arab" typeface="Times New Roman"/>
+        <a:font script="Hebr" typeface="Times New Roman"/>
+        <a:font script="Thai" typeface="Angsana New"/>
+        <a:font script="Ethi" typeface="Nyala"/>
+        <a:font script="Beng" typeface="Vrinda"/>
+        <a:font script="Gujr" typeface="Shruti"/>
+        <a:font script="Khmr" typeface="MoolBoran"/>
+        <a:font script="Knda" typeface="Tunga"/>
+        <a:font script="Guru" typeface="Raavi"/>
+        <a:font script="Cans" typeface="Euphemia"/>
+        <a:font script="Cher" typeface="Plantagenet Cherokee"/>
+        <a:font script="Yiii" typeface="Microsoft Yi Baiti"/>
+        <a:font script="Tibt" typeface="Microsoft Himalaya"/>
+        <a:font script="Thaa" typeface="MV Boli"/>
+        <a:font script="Deva" typeface="Mangal"/>
+        <a:font script="Telu" typeface="Gautami"/>
+        <a:font script="Taml" typeface="Latha"/>
+        <a:font script="Syrc" typeface="Estrangelo Edessa"/>
+        <a:font script="Orya" typeface="Kalinga"/>
+        <a:font script="Mlym" typeface="Kartika"/>
+        <a:font script="Laoo" typeface="DokChampa"/>
+        <a:font script="Sinh" typeface="Iskoola Pota"/>
+        <a:font script="Mong" typeface="Mongolian Baiti"/>
+        <a:font script="Viet" typeface="Times New Roman"/>
+        <a:font script="Uigh" typeface="Microsoft Uighur"/>
+        <a:font script="Geor" typeface="Sylfaen"/>
+        <a:font script="Armn" typeface="Arial"/>
+        <a:font script="Bugi" typeface="Leelawadee UI"/>
+        <a:font script="Bopo" typeface="Microsoft JhengHei"/>
+        <a:font script="Java" typeface="Javanese Text"/>
+        <a:font script="Lisu" typeface="Segoe UI"/>
+        <a:font script="Mymr" typeface="Myanmar Text"/>
+        <a:font script="Nkoo" typeface="Ebrima"/>
+        <a:font script="Olck" typeface="Nirmala UI"/>
+        <a:font script="Osma" typeface="Ebrima"/>
+        <a:font script="Phag" typeface="Phagspa"/>
+        <a:font script="Syrn" typeface="Estrangelo Edessa"/>
+        <a:font script="Syrj" typeface="Estrangelo Edessa"/>
+        <a:font script="Syre" typeface="Estrangelo Edessa"/>
+        <a:font script="Sora" typeface="Nirmala UI"/>
+        <a:font script="Tale" typeface="Microsoft Tai Le"/>
+        <a:font script="Talu" typeface="Microsoft New Tai Lue"/>
+        <a:font script="Tfng" typeface="Ebrima"/>
+      </a:majorFont>
+      <a:minorFont>
+        <a:latin typeface="Calibri" panose="020F0502020204030204"/>
+        <a:ea typeface=""/>
+        <a:cs typeface=""/>
+        <a:font script="Jpan" typeface="游ゴシック"/>
+        <a:font script="Hang" typeface="맑은 고딕"/>
+        <a:font script="Hans" typeface="等线"/>
+        <a:font script="Hant" typeface="新細明體"/>
+        <a:font script="Arab" typeface="Arial"/>
+        <a:font script="Hebr" typeface="Arial"/>
+        <a:font script="Thai" typeface="Cordia New"/>
+        <a:font script="Ethi" typeface="Nyala"/>
+        <a:font script="Beng" typeface="Vrinda"/>
+        <a:font script="Gujr" typeface="Shruti"/>
+        <a:font script="Khmr" typeface="DaunPenh"/>
+        <a:font script="Knda" typeface="Tunga"/>
+        <a:font script="Guru" typeface="Raavi"/>
+        <a:font script="Cans" typeface="Euphemia"/>
+        <a:font script="Cher" typeface="Plantagenet Cherokee"/>
+        <a:font script="Yiii" typeface="Microsoft Yi Baiti"/>
+        <a:font script="Tibt" typeface="Microsoft Himalaya"/>
+        <a:font script="Thaa" typeface="MV Boli"/>
+        <a:font script="Deva" typeface="Mangal"/>
+        <a:font script="Telu" typeface="Gautami"/>
+        <a:font script="Taml" typeface="Latha"/>
+        <a:font script="Syrc" typeface="Estrangelo Edessa"/>
+        <a:font script="Orya" typeface="Kalinga"/>
+        <a:font script="Mlym" typeface="Kartika"/>
+        <a:font script="Laoo" typeface="DokChampa"/>
+        <a:font script="Sinh" typeface="Iskoola Pota"/>
+        <a:font script="Mong" typeface="Mongolian Baiti"/>
+        <a:font script="Viet" typeface="Arial"/>
+        <a:font script="Uigh" typeface="Microsoft Uighur"/>
+        <a:font script="Geor" typeface="Sylfaen"/>
+        <a:font script="Armn" typeface="Arial"/>
+        <a:font script="Bugi" typeface="Leelawadee UI"/>
+        <a:font script="Bopo" typeface="Microsoft JhengHei"/>
+        <a:font script="Java" typeface="Javanese Text"/>
+        <a:font script="Lisu" typeface="Segoe UI"/>
+        <a:font script="Mymr" typeface="Myanmar Text"/>
+        <a:font script="Nkoo" typeface="Ebrima"/>
+        <a:font script="Olck" typeface="Nirmala UI"/>
+        <a:font script="Osma" typeface="Ebrima"/>
+        <a:font script="Phag" typeface="Phagspa"/>
+        <a:font script="Syrn" typeface="Estrangelo Edessa"/>
+        <a:font script="Syrj" typeface="Estrangelo Edessa"/>
+        <a:font script="Syre" typeface="Estrangelo Edessa"/>
+        <a:font script="Sora" typeface="Nirmala UI"/>
+        <a:font script="Tale" typeface="Microsoft Tai Le"/>
+        <a:font script="Talu" typeface="Microsoft New Tai Lue"/>
+        <a:font script="Tfng" typeface="Ebrima"/>
+      </a:minorFont>
+    </a:fontScheme>
+    <a:fmtScheme name="Office">
+      <a:fillStyleLst>
+        <a:solidFill>
+          <a:schemeClr val="phClr"/>
+        </a:solidFill>
+        <a:gradFill rotWithShape="1">
+          <a:gsLst>
+            <a:gs pos="0">
+              <a:schemeClr val="phClr">
+                <a:lumMod val="110000"/>
+                <a:satMod val="105000"/>
+                <a:tint val="67000"/>
+              </a:schemeClr>
+            </a:gs>
+            <a:gs pos="50000">
+              <a:schemeClr val="phClr">
+                <a:lumMod val="105000"/>
+                <a:satMod val="103000"/>
+                <a:tint val="73000"/>
+              </a:schemeClr>
+            </a:gs>
+            <a:gs pos="100000">
+              <a:schemeClr val="phClr">
+                <a:lumMod val="105000"/>
+                <a:satMod val="109000"/>
+                <a:tint val="81000"/>
+              </a:schemeClr>
+            </a:gs>
+          </a:gsLst>
+          <a:lin ang="5400000" scaled="0"/>
+        </a:gradFill>
+        <a:gradFill rotWithShape="1">
+          <a:gsLst>
+            <a:gs pos="0">
+              <a:schemeClr val="phClr">
+                <a:satMod val="103000"/>
+                <a:lumMod val="102000"/>
+                <a:tint val="94000"/>
+              </a:schemeClr>
+            </a:gs>
+            <a:gs pos="50000">
+              <a:schemeClr val="phClr">
+                <a:satMod val="110000"/>
+                <a:lumMod val="100000"/>
+                <a:shade val="100000"/>
+              </a:schemeClr>
+            </a:gs>
+            <a:gs pos="100000">
+              <a:schemeClr val="phClr">
+                <a:lumMod val="99000"/>
+                <a:satMod val="120000"/>
+                <a:shade val="78000"/>
+              </a:schemeClr>
+            </a:gs>
+          </a:gsLst>
+          <a:lin ang="5400000" scaled="0"/>
+        </a:gradFill>
+      </a:fillStyleLst>
+      <a:lnStyleLst>
+        <a:ln w="6350" cap="flat" cmpd="sng" algn="ctr">
+          <a:solidFill>
+            <a:schemeClr val="phClr"/>
+          </a:solidFill>
+          <a:prstDash val="solid"/>
+          <a:miter lim="800000"/>
+        </a:ln>
+        <a:ln w="12700" cap="flat" cmpd="sng" algn="ctr">
+          <a:solidFill>
+            <a:schemeClr val="phClr"/>
+          </a:solidFill>
+          <a:prstDash val="solid"/>
+          <a:miter lim="800000"/>
+        </a:ln>
+        <a:ln w="19050" cap="flat" cmpd="sng" algn="ctr">
+          <a:solidFill>
+            <a:schemeClr val="phClr"/>
+          </a:solidFill>
+          <a:prstDash val="solid"/>
+          <a:miter lim="800000"/>
+        </a:ln>
+      </a:lnStyleLst>
+      <a:effectStyleLst>
+        <a:effectStyle>
+          <a:effectLst/>
+        </a:effectStyle>
+        <a:effectStyle>
+          <a:effectLst/>
+        </a:effectStyle>
+        <a:effectStyle>
+          <a:effectLst>
+            <a:outerShdw blurRad="57150" dist="19050" dir="5400000" algn="ctr" rotWithShape="0">
+              <a:srgbClr val="000000">
+                <a:alpha val="63000"/>
+              </a:srgbClr>
+            </a:outerShdw>
+          </a:effectLst>
+        </a:effectStyle>
+      </a:effectStyleLst>
+      <a:bgFillStyleLst>
+        <a:solidFill>
+          <a:schemeClr val="phClr"/>
+        </a:solidFill>
+        <a:solidFill>
+          <a:schemeClr val="phClr">
+            <a:tint val="95000"/>
+            <a:satMod val="170000"/>
+          </a:schemeClr>
+        </a:solidFill>
+        <a:gradFill rotWithShape="1">
+          <a:gsLst>
+            <a:gs pos="0">
+              <a:schemeClr val="phClr">
+                <a:tint val="93000"/>
+                <a:satMod val="150000"/>
+                <a:shade val="98000"/>
+                <a:lumMod val="102000"/>
+              </a:schemeClr>
+            </a:gs>
+            <a:gs pos="50000">
+              <a:schemeClr val="phClr">
+                <a:tint val="98000"/>
+                <a:satMod val="130000"/>
+                <a:shade val="90000"/>
+                <a:lumMod val="103000"/>
+              </a:schemeClr>
+            </a:gs>
+            <a:gs pos="100000">
+              <a:schemeClr val="phClr">
+                <a:shade val="63000"/>
+                <a:satMod val="120000"/>
+              </a:schemeClr>
+            </a:gs>
+          </a:gsLst>
+          <a:lin ang="5400000" scaled="0"/>
+        </a:gradFill>
+      </a:bgFillStyleLst>
+    </a:fmtScheme>
+  </a:themeElements>
+  <a:objectDefaults/>
+  <a:extraClrSchemeLst/>
+  <a:extLst>
+    <a:ext uri="{05A4C25C-085E-4340-85A3-A5531E510DB2}">
+      <thm15:themeFamily xmlns:thm15="http://schemas.microsoft.com/office/thememl/2012/main" name="Office Theme" id="{62F939B6-93AF-4DB8-9C6B-D6C7DFDC589F}" vid="{4A3C46E8-61CC-4603-A589-7422A47A8E4A}"/>
+    </a:ext>
+  </a:extLst>
+</a:theme>
 </file>
</xml_diff>

<commit_message>
Exercicios do yoshi Vetores
</commit_message>
<xml_diff>
--- a/Larry Page.pptx
+++ b/Larry Page.pptx
@@ -3415,7 +3415,7 @@
         </p:nvSpPr>
         <p:spPr>
           <a:xfrm>
-            <a:off x="437321" y="3633770"/>
+            <a:off x="0" y="3731033"/>
             <a:ext cx="9218824" cy="1655762"/>
           </a:xfrm>
         </p:spPr>
@@ -3573,7 +3573,7 @@
   </p:clrMapOvr>
   <mc:AlternateContent xmlns:mc="http://schemas.openxmlformats.org/markup-compatibility/2006">
     <mc:Choice xmlns:p14="http://schemas.microsoft.com/office/powerpoint/2010/main" Requires="p14">
-      <p:transition p14:dur="0"/>
+      <p:transition p14:dur="10"/>
     </mc:Choice>
     <mc:Fallback>
       <p:transition/>
@@ -3651,7 +3651,7 @@
                 <a16:creationId xmlns:a16="http://schemas.microsoft.com/office/drawing/2014/main" id="{E4A809D5-3600-46D4-A466-67F2349A54FB}"/>
               </a:ext>
               <a:ext uri="{C183D7F6-B498-43B3-948B-1728B52AA6E4}">
-                <adec:decorative xmlns:adec="http://schemas.microsoft.com/office/drawing/2017/decorative" xmlns="" val="1"/>
+                <adec:decorative xmlns="" xmlns:adec="http://schemas.microsoft.com/office/drawing/2017/decorative" val="1"/>
               </a:ext>
             </a:extLst>
           </p:cNvPr>
@@ -4051,13 +4051,13 @@
   <p:clrMapOvr>
     <a:masterClrMapping/>
   </p:clrMapOvr>
-  <mc:AlternateContent xmlns:mc="http://schemas.openxmlformats.org/markup-compatibility/2006">
-    <mc:Choice xmlns:p14="http://schemas.microsoft.com/office/powerpoint/2010/main" Requires="p14">
+  <mc:AlternateContent xmlns:mc="http://schemas.openxmlformats.org/markup-compatibility/2006" xmlns:p14="http://schemas.microsoft.com/office/powerpoint/2010/main">
+    <mc:Choice Requires="p14">
       <p:transition spd="med" p14:dur="700">
         <p:fade/>
       </p:transition>
     </mc:Choice>
-    <mc:Fallback>
+    <mc:Fallback xmlns="">
       <p:transition spd="med">
         <p:fade/>
       </p:transition>
@@ -4490,13 +4490,13 @@
   <p:clrMapOvr>
     <a:masterClrMapping/>
   </p:clrMapOvr>
-  <mc:AlternateContent xmlns:mc="http://schemas.openxmlformats.org/markup-compatibility/2006">
-    <mc:Choice xmlns:p14="http://schemas.microsoft.com/office/powerpoint/2010/main" Requires="p14">
+  <mc:AlternateContent xmlns:mc="http://schemas.openxmlformats.org/markup-compatibility/2006" xmlns:p14="http://schemas.microsoft.com/office/powerpoint/2010/main">
+    <mc:Choice Requires="p14">
       <p:transition spd="slow" p14:dur="800">
         <p14:flythrough/>
       </p:transition>
     </mc:Choice>
-    <mc:Fallback>
+    <mc:Fallback xmlns="">
       <p:transition spd="slow">
         <p:fade/>
       </p:transition>
@@ -5444,13 +5444,13 @@
   <p:clrMapOvr>
     <a:masterClrMapping/>
   </p:clrMapOvr>
-  <mc:AlternateContent xmlns:mc="http://schemas.openxmlformats.org/markup-compatibility/2006">
-    <mc:Choice xmlns:p14="http://schemas.microsoft.com/office/powerpoint/2010/main" Requires="p14">
+  <mc:AlternateContent xmlns:mc="http://schemas.openxmlformats.org/markup-compatibility/2006" xmlns:p14="http://schemas.microsoft.com/office/powerpoint/2010/main">
+    <mc:Choice Requires="p14">
       <p:transition spd="med" p14:dur="700">
         <p:fade/>
       </p:transition>
     </mc:Choice>
-    <mc:Fallback>
+    <mc:Fallback xmlns="">
       <p:transition spd="med">
         <p:fade/>
       </p:transition>
@@ -6207,13 +6207,13 @@
   <p:clrMapOvr>
     <a:masterClrMapping/>
   </p:clrMapOvr>
-  <mc:AlternateContent xmlns:mc="http://schemas.openxmlformats.org/markup-compatibility/2006">
-    <mc:Choice xmlns:p14="http://schemas.microsoft.com/office/powerpoint/2010/main" Requires="p14">
+  <mc:AlternateContent xmlns:mc="http://schemas.openxmlformats.org/markup-compatibility/2006" xmlns:p14="http://schemas.microsoft.com/office/powerpoint/2010/main">
+    <mc:Choice Requires="p14">
       <p:transition>
         <p14:reveal/>
       </p:transition>
     </mc:Choice>
-    <mc:Fallback>
+    <mc:Fallback xmlns="">
       <p:transition>
         <p:fade/>
       </p:transition>

</xml_diff>